<commit_message>
Update concepts with Tony
</commit_message>
<xml_diff>
--- a/2017/python/Python Programming Concepts II.pptx
+++ b/2017/python/Python Programming Concepts II.pptx
@@ -269,7 +269,7 @@
   </p:defaultTextStyle>
   <p:extLst>
     <p:ext uri="{EFAFB233-063F-42B5-8137-9DF3F51BA10A}">
-      <p15:sldGuideLst xmlns:p15="http://schemas.microsoft.com/office/powerpoint/2012/main">
+      <p15:sldGuideLst xmlns:p15="http://schemas.microsoft.com/office/powerpoint/2012/main" xmlns="">
         <p15:guide id="1" orient="horz" pos="2160">
           <p15:clr>
             <a:srgbClr val="A4A3A4"/>
@@ -11185,6 +11185,36 @@
           <a:chExt cx="0" cy="0"/>
         </a:xfrm>
       </p:grpSpPr>
+      <p:pic>
+        <p:nvPicPr>
+          <p:cNvPr id="4" name="Picture 3" descr="Messages Image(608439154).png"/>
+          <p:cNvPicPr>
+            <a:picLocks noChangeAspect="1"/>
+          </p:cNvPicPr>
+          <p:nvPr/>
+        </p:nvPicPr>
+        <p:blipFill>
+          <a:blip r:embed="rId3">
+            <a:extLst>
+              <a:ext uri="{28A0092B-C50C-407E-A947-70E740481C1C}">
+                <a14:useLocalDpi xmlns:a14="http://schemas.microsoft.com/office/drawing/2010/main" val="0"/>
+              </a:ext>
+            </a:extLst>
+          </a:blip>
+          <a:stretch>
+            <a:fillRect/>
+          </a:stretch>
+        </p:blipFill>
+        <p:spPr>
+          <a:xfrm>
+            <a:off x="0" y="0"/>
+            <a:ext cx="9144000" cy="6858000"/>
+          </a:xfrm>
+          <a:prstGeom prst="rect">
+            <a:avLst/>
+          </a:prstGeom>
+        </p:spPr>
+      </p:pic>
       <p:sp>
         <p:nvSpPr>
           <p:cNvPr id="51" name="Shape 51"/>
@@ -11197,7 +11227,7 @@
         </p:nvSpPr>
         <p:spPr>
           <a:xfrm>
-            <a:off x="685800" y="2111123"/>
+            <a:off x="1789953" y="-504296"/>
             <a:ext cx="7772400" cy="1546474"/>
           </a:xfrm>
           <a:prstGeom prst="rect">
@@ -11217,42 +11247,39 @@
               <a:buNone/>
             </a:pPr>
             <a:r>
-              <a:rPr lang="en" sz="7200" dirty="0">
+              <a:rPr lang="en" sz="4000" dirty="0">
                 <a:solidFill>
                   <a:srgbClr val="FF0000"/>
                 </a:solidFill>
                 <a:latin typeface="Yanone Kaffeesatz Regular"/>
-                <a:ea typeface="Open Sans"/>
                 <a:cs typeface="Yanone Kaffeesatz Regular"/>
               </a:rPr>
               <a:t>Programming</a:t>
             </a:r>
             <a:r>
-              <a:rPr lang="en" dirty="0"/>
+              <a:rPr lang="en" sz="4000" dirty="0"/>
               <a:t> </a:t>
             </a:r>
             <a:r>
-              <a:rPr lang="en" sz="7200" dirty="0">
+              <a:rPr lang="en" sz="4000" dirty="0">
                 <a:solidFill>
                   <a:srgbClr val="FF0000"/>
                 </a:solidFill>
                 <a:latin typeface="Yanone Kaffeesatz Regular"/>
-                <a:ea typeface="Open Sans"/>
                 <a:cs typeface="Yanone Kaffeesatz Regular"/>
               </a:rPr>
               <a:t>Concepts</a:t>
             </a:r>
             <a:r>
-              <a:rPr lang="en" dirty="0"/>
+              <a:rPr lang="en" sz="4000" dirty="0"/>
               <a:t> </a:t>
             </a:r>
             <a:r>
-              <a:rPr lang="en" sz="7200" dirty="0">
+              <a:rPr lang="en" sz="4000" dirty="0">
                 <a:solidFill>
                   <a:srgbClr val="FF0000"/>
                 </a:solidFill>
                 <a:latin typeface="Yanone Kaffeesatz Regular"/>
-                <a:ea typeface="Open Sans"/>
                 <a:cs typeface="Yanone Kaffeesatz Regular"/>
               </a:rPr>
               <a:t>II</a:t>
@@ -11272,8 +11299,8 @@
         </p:nvSpPr>
         <p:spPr>
           <a:xfrm>
-            <a:off x="685800" y="3786737"/>
-            <a:ext cx="7772400" cy="1046317"/>
+            <a:off x="6604000" y="1096536"/>
+            <a:ext cx="2540000" cy="1046317"/>
           </a:xfrm>
           <a:prstGeom prst="rect">
             <a:avLst/>
@@ -11301,7 +11328,7 @@
             </a:r>
             <a:r>
               <a:rPr lang="en-US" dirty="0"/>
-              <a:t>6</a:t>
+              <a:t>7</a:t>
             </a:r>
             <a:endParaRPr lang="en" dirty="0"/>
           </a:p>
@@ -11312,7 +11339,7 @@
   <p:clrMapOvr>
     <a:masterClrMapping/>
   </p:clrMapOvr>
-  <p:transition spd="slow">
+  <p:transition xmlns:p14="http://schemas.microsoft.com/office/powerpoint/2010/main" spd="slow">
     <p:cut/>
   </p:transition>
 </p:sld>
@@ -11673,7 +11700,7 @@
   <p:clrMapOvr>
     <a:masterClrMapping/>
   </p:clrMapOvr>
-  <p:transition spd="slow">
+  <p:transition xmlns:p14="http://schemas.microsoft.com/office/powerpoint/2010/main" spd="slow">
     <p:cut/>
   </p:transition>
 </p:sld>
@@ -12127,7 +12154,7 @@
   <p:clrMapOvr>
     <a:masterClrMapping/>
   </p:clrMapOvr>
-  <p:transition spd="slow">
+  <p:transition xmlns:p14="http://schemas.microsoft.com/office/powerpoint/2010/main" spd="slow">
     <p:cut/>
   </p:transition>
 </p:sld>
@@ -12257,7 +12284,7 @@
   <p:clrMapOvr>
     <a:masterClrMapping/>
   </p:clrMapOvr>
-  <p:transition spd="slow">
+  <p:transition xmlns:p14="http://schemas.microsoft.com/office/powerpoint/2010/main" spd="slow">
     <p:cut/>
   </p:transition>
 </p:sld>
@@ -12421,7 +12448,7 @@
   <p:clrMapOvr>
     <a:masterClrMapping/>
   </p:clrMapOvr>
-  <p:transition spd="slow">
+  <p:transition xmlns:p14="http://schemas.microsoft.com/office/powerpoint/2010/main" spd="slow">
     <p:cut/>
   </p:transition>
 </p:sld>
@@ -12684,13 +12711,13 @@
   <p:clrMapOvr>
     <a:overrideClrMapping bg1="lt1" tx1="dk1" bg2="dk2" tx2="lt2" accent1="accent1" accent2="accent2" accent3="accent3" accent4="accent4" accent5="accent5" accent6="accent6" hlink="hlink" folHlink="folHlink"/>
   </p:clrMapOvr>
-  <p:transition spd="slow">
+  <p:transition xmlns:p14="http://schemas.microsoft.com/office/powerpoint/2010/main" spd="slow">
     <p:cut/>
   </p:transition>
   <p:timing>
     <p:tnLst>
       <p:par>
-        <p:cTn id="1" dur="indefinite" restart="never" nodeType="tmRoot"/>
+        <p:cTn xmlns:p14="http://schemas.microsoft.com/office/powerpoint/2010/main" id="1" dur="indefinite" restart="never" nodeType="tmRoot"/>
       </p:par>
     </p:tnLst>
   </p:timing>
@@ -12861,8 +12888,65 @@
                 <a:cs typeface="Menlo Regular"/>
                 <a:sym typeface="Courier New"/>
               </a:rPr>
-              <a:t>if fruit == “plum”:</a:t>
-            </a:r>
+              <a:t>if fruit == </a:t>
+            </a:r>
+            <a:r>
+              <a:rPr lang="en-US" sz="2800" dirty="0" smtClean="0">
+                <a:solidFill>
+                  <a:srgbClr val="0B5C92"/>
+                </a:solidFill>
+                <a:latin typeface="Menlo Regular"/>
+                <a:ea typeface="Menlo Regular"/>
+                <a:cs typeface="Menlo Regular"/>
+                <a:sym typeface="Courier New"/>
+              </a:rPr>
+              <a:t>"</a:t>
+            </a:r>
+            <a:r>
+              <a:rPr lang="en" sz="2800" dirty="0" smtClean="0">
+                <a:solidFill>
+                  <a:srgbClr val="0B5C92"/>
+                </a:solidFill>
+                <a:latin typeface="Menlo Regular"/>
+                <a:ea typeface="Menlo Regular"/>
+                <a:cs typeface="Menlo Regular"/>
+                <a:sym typeface="Courier New"/>
+              </a:rPr>
+              <a:t>plum</a:t>
+            </a:r>
+            <a:r>
+              <a:rPr lang="en-US" sz="2800" dirty="0">
+                <a:solidFill>
+                  <a:srgbClr val="0B5C92"/>
+                </a:solidFill>
+                <a:latin typeface="Menlo Regular"/>
+                <a:ea typeface="Menlo Regular"/>
+                <a:cs typeface="Menlo Regular"/>
+                <a:sym typeface="Courier New"/>
+              </a:rPr>
+              <a:t>"</a:t>
+            </a:r>
+            <a:r>
+              <a:rPr lang="en" sz="2800" dirty="0" smtClean="0">
+                <a:solidFill>
+                  <a:srgbClr val="0B5C92"/>
+                </a:solidFill>
+                <a:latin typeface="Menlo Regular"/>
+                <a:ea typeface="Menlo Regular"/>
+                <a:cs typeface="Menlo Regular"/>
+                <a:sym typeface="Courier New"/>
+              </a:rPr>
+              <a:t>:</a:t>
+            </a:r>
+            <a:endParaRPr lang="en" sz="2800" dirty="0">
+              <a:solidFill>
+                <a:srgbClr val="0B5C92"/>
+              </a:solidFill>
+              <a:latin typeface="Menlo Regular"/>
+              <a:ea typeface="Menlo Regular"/>
+              <a:cs typeface="Menlo Regular"/>
+              <a:sym typeface="Courier New"/>
+            </a:endParaRPr>
           </a:p>
           <a:p>
             <a:pPr lvl="0">
@@ -12939,13 +13023,13 @@
   <p:clrMapOvr>
     <a:masterClrMapping/>
   </p:clrMapOvr>
-  <p:transition spd="slow">
+  <p:transition xmlns:p14="http://schemas.microsoft.com/office/powerpoint/2010/main" spd="slow">
     <p:cut/>
   </p:transition>
   <p:timing>
     <p:tnLst>
       <p:par>
-        <p:cTn id="1" dur="indefinite" restart="never" nodeType="tmRoot"/>
+        <p:cTn xmlns:p14="http://schemas.microsoft.com/office/powerpoint/2010/main" id="1" dur="indefinite" restart="never" nodeType="tmRoot"/>
       </p:par>
     </p:tnLst>
   </p:timing>
@@ -13164,13 +13248,13 @@
   <p:clrMapOvr>
     <a:masterClrMapping/>
   </p:clrMapOvr>
-  <p:transition spd="slow">
+  <p:transition xmlns:p14="http://schemas.microsoft.com/office/powerpoint/2010/main" spd="slow">
     <p:cut/>
   </p:transition>
   <p:timing>
     <p:tnLst>
       <p:par>
-        <p:cTn id="1" dur="indefinite" restart="never" nodeType="tmRoot"/>
+        <p:cTn xmlns:p14="http://schemas.microsoft.com/office/powerpoint/2010/main" id="1" dur="indefinite" restart="never" nodeType="tmRoot"/>
       </p:par>
     </p:tnLst>
   </p:timing>
@@ -13381,7 +13465,18 @@
                 <a:cs typeface="Menlo Regular"/>
                 <a:sym typeface="Courier New"/>
               </a:rPr>
-              <a:t>VA“</a:t>
+              <a:t>VA</a:t>
+            </a:r>
+            <a:r>
+              <a:rPr lang="en-US" sz="2400" dirty="0" smtClean="0">
+                <a:solidFill>
+                  <a:srgbClr val="D20035"/>
+                </a:solidFill>
+                <a:latin typeface="Menlo Regular"/>
+                <a:cs typeface="Menlo Regular"/>
+                <a:sym typeface="Courier New"/>
+              </a:rPr>
+              <a:t>"</a:t>
             </a:r>
             <a:r>
               <a:rPr lang="en" sz="2400" dirty="0" smtClean="0">
@@ -13441,7 +13536,29 @@
                 <a:cs typeface="Menlo Regular"/>
                 <a:sym typeface="Courier New"/>
               </a:rPr>
-              <a:t>MD“:</a:t>
+              <a:t>MD</a:t>
+            </a:r>
+            <a:r>
+              <a:rPr lang="en-US" sz="2400" dirty="0" smtClean="0">
+                <a:solidFill>
+                  <a:srgbClr val="D20035"/>
+                </a:solidFill>
+                <a:latin typeface="Menlo Regular"/>
+                <a:cs typeface="Menlo Regular"/>
+                <a:sym typeface="Courier New"/>
+              </a:rPr>
+              <a:t>"</a:t>
+            </a:r>
+            <a:r>
+              <a:rPr lang="en" sz="2400" dirty="0" smtClean="0">
+                <a:solidFill>
+                  <a:srgbClr val="D20035"/>
+                </a:solidFill>
+                <a:latin typeface="Menlo Regular"/>
+                <a:cs typeface="Menlo Regular"/>
+                <a:sym typeface="Courier New"/>
+              </a:rPr>
+              <a:t>:</a:t>
             </a:r>
             <a:r>
               <a:rPr lang="en" sz="2400" dirty="0" smtClean="0">
@@ -13561,7 +13678,127 @@
                 <a:cs typeface="Menlo Regular"/>
                 <a:sym typeface="courier new"/>
               </a:rPr>
-              <a:t>	print(“%s” % code + “ is the code for ” + 	“%s.” % state)</a:t>
+              <a:t>	print</a:t>
+            </a:r>
+            <a:r>
+              <a:rPr lang="en-US" sz="2400" dirty="0" smtClean="0">
+                <a:solidFill>
+                  <a:srgbClr val="0B5C92"/>
+                </a:solidFill>
+                <a:latin typeface="Menlo Regular"/>
+                <a:ea typeface="Menlo Regular"/>
+                <a:cs typeface="Menlo Regular"/>
+                <a:sym typeface="courier new"/>
+              </a:rPr>
+              <a:t>("%s" </a:t>
+            </a:r>
+            <a:r>
+              <a:rPr lang="en-US" sz="2400" dirty="0" smtClean="0">
+                <a:solidFill>
+                  <a:srgbClr val="0B5C92"/>
+                </a:solidFill>
+                <a:latin typeface="Menlo Regular"/>
+                <a:ea typeface="Menlo Regular"/>
+                <a:cs typeface="Menlo Regular"/>
+                <a:sym typeface="courier new"/>
+              </a:rPr>
+              <a:t>% code + </a:t>
+            </a:r>
+            <a:r>
+              <a:rPr lang="en-US" sz="2400" dirty="0" smtClean="0">
+                <a:solidFill>
+                  <a:srgbClr val="0B5C92"/>
+                </a:solidFill>
+                <a:latin typeface="Menlo Regular"/>
+                <a:ea typeface="Menlo Regular"/>
+                <a:cs typeface="Menlo Regular"/>
+                <a:sym typeface="courier new"/>
+              </a:rPr>
+              <a:t>" </a:t>
+            </a:r>
+            <a:r>
+              <a:rPr lang="en-US" sz="2400" dirty="0" smtClean="0">
+                <a:solidFill>
+                  <a:srgbClr val="0B5C92"/>
+                </a:solidFill>
+                <a:latin typeface="Menlo Regular"/>
+                <a:ea typeface="Menlo Regular"/>
+                <a:cs typeface="Menlo Regular"/>
+                <a:sym typeface="courier new"/>
+              </a:rPr>
+              <a:t>is the code for </a:t>
+            </a:r>
+            <a:r>
+              <a:rPr lang="en-US" sz="2400" dirty="0" smtClean="0">
+                <a:solidFill>
+                  <a:srgbClr val="0B5C92"/>
+                </a:solidFill>
+                <a:latin typeface="Menlo Regular"/>
+                <a:ea typeface="Menlo Regular"/>
+                <a:cs typeface="Menlo Regular"/>
+                <a:sym typeface="courier new"/>
+              </a:rPr>
+              <a:t>" </a:t>
+            </a:r>
+            <a:r>
+              <a:rPr lang="en-US" sz="2400" dirty="0" smtClean="0">
+                <a:solidFill>
+                  <a:srgbClr val="0B5C92"/>
+                </a:solidFill>
+                <a:latin typeface="Menlo Regular"/>
+                <a:ea typeface="Menlo Regular"/>
+                <a:cs typeface="Menlo Regular"/>
+                <a:sym typeface="courier new"/>
+              </a:rPr>
+              <a:t>+ 	</a:t>
+            </a:r>
+            <a:r>
+              <a:rPr lang="en-US" sz="2400" dirty="0" smtClean="0">
+                <a:solidFill>
+                  <a:srgbClr val="0B5C92"/>
+                </a:solidFill>
+                <a:latin typeface="Menlo Regular"/>
+                <a:ea typeface="Menlo Regular"/>
+                <a:cs typeface="Menlo Regular"/>
+                <a:sym typeface="courier new"/>
+              </a:rPr>
+              <a:t>"%</a:t>
+            </a:r>
+            <a:r>
+              <a:rPr lang="en-US" sz="2400" dirty="0" smtClean="0">
+                <a:solidFill>
+                  <a:srgbClr val="0B5C92"/>
+                </a:solidFill>
+                <a:latin typeface="Menlo Regular"/>
+                <a:ea typeface="Menlo Regular"/>
+                <a:cs typeface="Menlo Regular"/>
+                <a:sym typeface="courier new"/>
+              </a:rPr>
+              <a:t>s</a:t>
+            </a:r>
+            <a:r>
+              <a:rPr lang="en-US" sz="2400" dirty="0" smtClean="0">
+                <a:solidFill>
+                  <a:srgbClr val="0B5C92"/>
+                </a:solidFill>
+                <a:latin typeface="Menlo Regular"/>
+                <a:ea typeface="Menlo Regular"/>
+                <a:cs typeface="Menlo Regular"/>
+                <a:sym typeface="courier new"/>
+              </a:rPr>
+              <a:t>." </a:t>
+            </a:r>
+            <a:r>
+              <a:rPr lang="en-US" sz="2400" dirty="0" smtClean="0">
+                <a:solidFill>
+                  <a:srgbClr val="0B5C92"/>
+                </a:solidFill>
+                <a:latin typeface="Menlo Regular"/>
+                <a:ea typeface="Menlo Regular"/>
+                <a:cs typeface="Menlo Regular"/>
+                <a:sym typeface="courier new"/>
+              </a:rPr>
+              <a:t>% state)</a:t>
             </a:r>
           </a:p>
           <a:p>
@@ -13611,13 +13848,13 @@
   <p:clrMapOvr>
     <a:masterClrMapping/>
   </p:clrMapOvr>
-  <p:transition spd="slow">
+  <p:transition xmlns:p14="http://schemas.microsoft.com/office/powerpoint/2010/main" spd="slow">
     <p:cut/>
   </p:transition>
   <p:timing>
     <p:tnLst>
       <p:par>
-        <p:cTn id="1" dur="indefinite" restart="never" nodeType="tmRoot"/>
+        <p:cTn xmlns:p14="http://schemas.microsoft.com/office/powerpoint/2010/main" id="1" dur="indefinite" restart="never" nodeType="tmRoot"/>
       </p:par>
     </p:tnLst>
   </p:timing>
@@ -13850,6 +14087,18 @@
               <a:t>(</a:t>
             </a:r>
             <a:r>
+              <a:rPr lang="en-US" sz="2400" dirty="0">
+                <a:solidFill>
+                  <a:srgbClr val="FF0000"/>
+                </a:solidFill>
+                <a:latin typeface="Menlo Regular"/>
+                <a:ea typeface="Menlo Regular"/>
+                <a:cs typeface="Menlo Regular"/>
+                <a:sym typeface="Courier New"/>
+              </a:rPr>
+              <a:t>"</a:t>
+            </a:r>
+            <a:r>
               <a:rPr lang="en-US" sz="2400" dirty="0" smtClean="0">
                 <a:solidFill>
                   <a:srgbClr val="FF0000"/>
@@ -13859,7 +14108,31 @@
                 <a:cs typeface="Menlo Regular"/>
                 <a:sym typeface="Courier New"/>
               </a:rPr>
-              <a:t>“I’m at number ” </a:t>
+              <a:t>I'm </a:t>
+            </a:r>
+            <a:r>
+              <a:rPr lang="en-US" sz="2400" dirty="0" smtClean="0">
+                <a:solidFill>
+                  <a:srgbClr val="FF0000"/>
+                </a:solidFill>
+                <a:latin typeface="Menlo Regular"/>
+                <a:ea typeface="Menlo Regular"/>
+                <a:cs typeface="Menlo Regular"/>
+                <a:sym typeface="Courier New"/>
+              </a:rPr>
+              <a:t>at number </a:t>
+            </a:r>
+            <a:r>
+              <a:rPr lang="en-US" sz="2400" dirty="0" smtClean="0">
+                <a:solidFill>
+                  <a:srgbClr val="FF0000"/>
+                </a:solidFill>
+                <a:latin typeface="Menlo Regular"/>
+                <a:ea typeface="Menlo Regular"/>
+                <a:cs typeface="Menlo Regular"/>
+                <a:sym typeface="Courier New"/>
+              </a:rPr>
+              <a:t>" </a:t>
             </a:r>
             <a:r>
               <a:rPr lang="en-US" sz="2400" dirty="0" smtClean="0">
@@ -14101,16 +14374,40 @@
               <a:t>print</a:t>
             </a:r>
             <a:r>
+              <a:rPr lang="en-US" sz="2400" dirty="0" smtClean="0">
+                <a:solidFill>
+                  <a:schemeClr val="tx1"/>
+                </a:solidFill>
+                <a:latin typeface="Menlo Regular"/>
+                <a:ea typeface="Menlo Regular"/>
+                <a:cs typeface="Menlo Regular"/>
+                <a:sym typeface="Courier New"/>
+              </a:rPr>
+              <a:t>(</a:t>
+            </a:r>
+            <a:r>
               <a:rPr lang="en-US" sz="2400" dirty="0">
                 <a:solidFill>
-                  <a:schemeClr val="tx1"/>
-                </a:solidFill>
-                <a:latin typeface="Menlo Regular"/>
-                <a:ea typeface="Menlo Regular"/>
-                <a:cs typeface="Menlo Regular"/>
-                <a:sym typeface="Courier New"/>
-              </a:rPr>
-              <a:t>(</a:t>
+                  <a:srgbClr val="FF0000"/>
+                </a:solidFill>
+                <a:latin typeface="Menlo Regular"/>
+                <a:ea typeface="Menlo Regular"/>
+                <a:cs typeface="Menlo Regular"/>
+                <a:sym typeface="Courier New"/>
+              </a:rPr>
+              <a:t>"</a:t>
+            </a:r>
+            <a:r>
+              <a:rPr lang="en-US" sz="2400" dirty="0" smtClean="0">
+                <a:solidFill>
+                  <a:srgbClr val="FF0000"/>
+                </a:solidFill>
+                <a:latin typeface="Menlo Regular"/>
+                <a:ea typeface="Menlo Regular"/>
+                <a:cs typeface="Menlo Regular"/>
+                <a:sym typeface="Courier New"/>
+              </a:rPr>
+              <a:t>I'm </a:t>
             </a:r>
             <a:r>
               <a:rPr lang="en-US" sz="2400" dirty="0">
@@ -14122,7 +14419,19 @@
                 <a:cs typeface="Menlo Regular"/>
                 <a:sym typeface="Courier New"/>
               </a:rPr>
-              <a:t>“I’m at number ” </a:t>
+              <a:t>at number </a:t>
+            </a:r>
+            <a:r>
+              <a:rPr lang="en-US" sz="2400" dirty="0" smtClean="0">
+                <a:solidFill>
+                  <a:srgbClr val="FF0000"/>
+                </a:solidFill>
+                <a:latin typeface="Menlo Regular"/>
+                <a:ea typeface="Menlo Regular"/>
+                <a:cs typeface="Menlo Regular"/>
+                <a:sym typeface="Courier New"/>
+              </a:rPr>
+              <a:t>" </a:t>
             </a:r>
             <a:r>
               <a:rPr lang="en-US" sz="2400" dirty="0">
@@ -14352,16 +14661,40 @@
               <a:t>print</a:t>
             </a:r>
             <a:r>
+              <a:rPr lang="en-US" sz="2400" dirty="0" smtClean="0">
+                <a:solidFill>
+                  <a:schemeClr val="tx1"/>
+                </a:solidFill>
+                <a:latin typeface="Menlo Regular"/>
+                <a:ea typeface="Menlo Regular"/>
+                <a:cs typeface="Menlo Regular"/>
+                <a:sym typeface="Courier New"/>
+              </a:rPr>
+              <a:t>(</a:t>
+            </a:r>
+            <a:r>
               <a:rPr lang="en-US" sz="2400" dirty="0">
                 <a:solidFill>
-                  <a:schemeClr val="tx1"/>
-                </a:solidFill>
-                <a:latin typeface="Menlo Regular"/>
-                <a:ea typeface="Menlo Regular"/>
-                <a:cs typeface="Menlo Regular"/>
-                <a:sym typeface="Courier New"/>
-              </a:rPr>
-              <a:t>(</a:t>
+                  <a:srgbClr val="FF0000"/>
+                </a:solidFill>
+                <a:latin typeface="Menlo Regular"/>
+                <a:ea typeface="Menlo Regular"/>
+                <a:cs typeface="Menlo Regular"/>
+                <a:sym typeface="Courier New"/>
+              </a:rPr>
+              <a:t>"</a:t>
+            </a:r>
+            <a:r>
+              <a:rPr lang="en-US" sz="2400" dirty="0" smtClean="0">
+                <a:solidFill>
+                  <a:srgbClr val="FF0000"/>
+                </a:solidFill>
+                <a:latin typeface="Menlo Regular"/>
+                <a:ea typeface="Menlo Regular"/>
+                <a:cs typeface="Menlo Regular"/>
+                <a:sym typeface="Courier New"/>
+              </a:rPr>
+              <a:t>I'm </a:t>
             </a:r>
             <a:r>
               <a:rPr lang="en-US" sz="2400" dirty="0">
@@ -14373,7 +14706,19 @@
                 <a:cs typeface="Menlo Regular"/>
                 <a:sym typeface="Courier New"/>
               </a:rPr>
-              <a:t>“I’m at number ” </a:t>
+              <a:t>at number </a:t>
+            </a:r>
+            <a:r>
+              <a:rPr lang="en-US" sz="2400" dirty="0" smtClean="0">
+                <a:solidFill>
+                  <a:srgbClr val="FF0000"/>
+                </a:solidFill>
+                <a:latin typeface="Menlo Regular"/>
+                <a:ea typeface="Menlo Regular"/>
+                <a:cs typeface="Menlo Regular"/>
+                <a:sym typeface="Courier New"/>
+              </a:rPr>
+              <a:t>" </a:t>
             </a:r>
             <a:r>
               <a:rPr lang="en-US" sz="2400" dirty="0">
@@ -14473,13 +14818,13 @@
   <p:clrMapOvr>
     <a:masterClrMapping/>
   </p:clrMapOvr>
-  <p:transition spd="slow">
+  <p:transition xmlns:p14="http://schemas.microsoft.com/office/powerpoint/2010/main" spd="slow">
     <p:cut/>
   </p:transition>
   <p:timing>
     <p:tnLst>
       <p:par>
-        <p:cTn id="1" dur="indefinite" restart="never" nodeType="tmRoot"/>
+        <p:cTn xmlns:p14="http://schemas.microsoft.com/office/powerpoint/2010/main" id="1" dur="indefinite" restart="never" nodeType="tmRoot"/>
       </p:par>
     </p:tnLst>
   </p:timing>
@@ -14963,13 +15308,13 @@
   <p:clrMapOvr>
     <a:masterClrMapping/>
   </p:clrMapOvr>
-  <p:transition spd="slow">
+  <p:transition xmlns:p14="http://schemas.microsoft.com/office/powerpoint/2010/main" spd="slow">
     <p:cut/>
   </p:transition>
   <p:timing>
     <p:tnLst>
       <p:par>
-        <p:cTn id="1" dur="indefinite" restart="never" nodeType="tmRoot"/>
+        <p:cTn xmlns:p14="http://schemas.microsoft.com/office/powerpoint/2010/main" id="1" dur="indefinite" restart="never" nodeType="tmRoot"/>
       </p:par>
     </p:tnLst>
   </p:timing>
@@ -15100,7 +15445,7 @@
   <p:clrMapOvr>
     <a:masterClrMapping/>
   </p:clrMapOvr>
-  <p:transition spd="slow">
+  <p:transition xmlns:p14="http://schemas.microsoft.com/office/powerpoint/2010/main" spd="slow">
     <p:cut/>
   </p:transition>
 </p:sld>
@@ -15304,7 +15649,31 @@
                 <a:cs typeface="Menlo Regular"/>
                 <a:sym typeface="Courier New"/>
               </a:rPr>
-              <a:t>plum“:</a:t>
+              <a:t>plum</a:t>
+            </a:r>
+            <a:r>
+              <a:rPr lang="en-US" sz="2400" dirty="0" smtClean="0">
+                <a:solidFill>
+                  <a:srgbClr val="FF0000"/>
+                </a:solidFill>
+                <a:latin typeface="Menlo Regular"/>
+                <a:ea typeface="Menlo Regular"/>
+                <a:cs typeface="Menlo Regular"/>
+                <a:sym typeface="Courier New"/>
+              </a:rPr>
+              <a:t>"</a:t>
+            </a:r>
+            <a:r>
+              <a:rPr lang="en" sz="2400" dirty="0" smtClean="0">
+                <a:solidFill>
+                  <a:srgbClr val="FF0000"/>
+                </a:solidFill>
+                <a:latin typeface="Menlo Regular"/>
+                <a:ea typeface="Menlo Regular"/>
+                <a:cs typeface="Menlo Regular"/>
+                <a:sym typeface="Courier New"/>
+              </a:rPr>
+              <a:t>:</a:t>
             </a:r>
             <a:endParaRPr lang="en" sz="2400" dirty="0">
               <a:solidFill>
@@ -15580,7 +15949,43 @@
                 <a:cs typeface="Menlo Regular"/>
                 <a:sym typeface="Courier New"/>
               </a:rPr>
-              <a:t>"plum“:</a:t>
+              <a:t>"</a:t>
+            </a:r>
+            <a:r>
+              <a:rPr lang="en" sz="2400" dirty="0" smtClean="0">
+                <a:solidFill>
+                  <a:srgbClr val="FF0000"/>
+                </a:solidFill>
+                <a:latin typeface="Menlo Regular"/>
+                <a:ea typeface="Menlo Regular"/>
+                <a:cs typeface="Menlo Regular"/>
+                <a:sym typeface="Courier New"/>
+              </a:rPr>
+              <a:t>plum</a:t>
+            </a:r>
+            <a:r>
+              <a:rPr lang="en-US" sz="2400" dirty="0" smtClean="0">
+                <a:solidFill>
+                  <a:srgbClr val="FF0000"/>
+                </a:solidFill>
+                <a:latin typeface="Menlo Regular"/>
+                <a:ea typeface="Menlo Regular"/>
+                <a:cs typeface="Menlo Regular"/>
+                <a:sym typeface="Courier New"/>
+              </a:rPr>
+              <a:t>"</a:t>
+            </a:r>
+            <a:r>
+              <a:rPr lang="en" sz="2400" dirty="0" smtClean="0">
+                <a:solidFill>
+                  <a:srgbClr val="FF0000"/>
+                </a:solidFill>
+                <a:latin typeface="Menlo Regular"/>
+                <a:ea typeface="Menlo Regular"/>
+                <a:cs typeface="Menlo Regular"/>
+                <a:sym typeface="Courier New"/>
+              </a:rPr>
+              <a:t>:</a:t>
             </a:r>
             <a:r>
               <a:rPr lang="en" sz="2400" dirty="0" smtClean="0">
@@ -15668,13 +16073,13 @@
   <p:clrMapOvr>
     <a:masterClrMapping/>
   </p:clrMapOvr>
-  <p:transition spd="slow">
+  <p:transition xmlns:p14="http://schemas.microsoft.com/office/powerpoint/2010/main" spd="slow">
     <p:cut/>
   </p:transition>
   <p:timing>
     <p:tnLst>
       <p:par>
-        <p:cTn id="1" dur="indefinite" restart="never" nodeType="tmRoot"/>
+        <p:cTn xmlns:p14="http://schemas.microsoft.com/office/powerpoint/2010/main" id="1" dur="indefinite" restart="never" nodeType="tmRoot"/>
       </p:par>
     </p:tnLst>
   </p:timing>
@@ -16069,7 +16474,31 @@
                 <a:cs typeface="Menlo Regular"/>
                 <a:sym typeface="Courier New"/>
               </a:rPr>
-              <a:t>apple“:</a:t>
+              <a:t>apple</a:t>
+            </a:r>
+            <a:r>
+              <a:rPr lang="en-US" sz="1800" dirty="0" smtClean="0">
+                <a:solidFill>
+                  <a:srgbClr val="FF0000"/>
+                </a:solidFill>
+                <a:latin typeface="Menlo Regular"/>
+                <a:ea typeface="Menlo Regular"/>
+                <a:cs typeface="Menlo Regular"/>
+                <a:sym typeface="Courier New"/>
+              </a:rPr>
+              <a:t>"</a:t>
+            </a:r>
+            <a:r>
+              <a:rPr lang="en" sz="1800" dirty="0" smtClean="0">
+                <a:solidFill>
+                  <a:srgbClr val="FF0000"/>
+                </a:solidFill>
+                <a:latin typeface="Menlo Regular"/>
+                <a:ea typeface="Menlo Regular"/>
+                <a:cs typeface="Menlo Regular"/>
+                <a:sym typeface="Courier New"/>
+              </a:rPr>
+              <a:t>:</a:t>
             </a:r>
             <a:endParaRPr lang="en" sz="1800" dirty="0">
               <a:solidFill>
@@ -16122,7 +16551,31 @@
                 <a:cs typeface="Menlo Regular"/>
                 <a:sym typeface="Courier New"/>
               </a:rPr>
-              <a:t>"Yum!“</a:t>
+              <a:t>"Yum</a:t>
+            </a:r>
+            <a:r>
+              <a:rPr lang="en" sz="1800" dirty="0" smtClean="0">
+                <a:solidFill>
+                  <a:srgbClr val="FF0000"/>
+                </a:solidFill>
+                <a:latin typeface="Menlo Regular"/>
+                <a:ea typeface="Menlo Regular"/>
+                <a:cs typeface="Menlo Regular"/>
+                <a:sym typeface="Courier New"/>
+              </a:rPr>
+              <a:t>!</a:t>
+            </a:r>
+            <a:r>
+              <a:rPr lang="en-US" sz="1800" dirty="0" smtClean="0">
+                <a:solidFill>
+                  <a:srgbClr val="FF0000"/>
+                </a:solidFill>
+                <a:latin typeface="Menlo Regular"/>
+                <a:ea typeface="Menlo Regular"/>
+                <a:cs typeface="Menlo Regular"/>
+                <a:sym typeface="Courier New"/>
+              </a:rPr>
+              <a:t>"</a:t>
             </a:r>
             <a:r>
               <a:rPr lang="en" sz="1800" dirty="0" smtClean="0">
@@ -16283,7 +16736,31 @@
                 <a:cs typeface="Menlo Regular"/>
                 <a:sym typeface="Courier New"/>
               </a:rPr>
-              <a:t>sand“:</a:t>
+              <a:t>sand</a:t>
+            </a:r>
+            <a:r>
+              <a:rPr lang="en-US" sz="1800" dirty="0" smtClean="0">
+                <a:solidFill>
+                  <a:srgbClr val="FF0000"/>
+                </a:solidFill>
+                <a:latin typeface="Menlo Regular"/>
+                <a:ea typeface="Menlo Regular"/>
+                <a:cs typeface="Menlo Regular"/>
+                <a:sym typeface="Courier New"/>
+              </a:rPr>
+              <a:t>"</a:t>
+            </a:r>
+            <a:r>
+              <a:rPr lang="en" sz="1800" dirty="0" smtClean="0">
+                <a:solidFill>
+                  <a:srgbClr val="FF0000"/>
+                </a:solidFill>
+                <a:latin typeface="Menlo Regular"/>
+                <a:ea typeface="Menlo Regular"/>
+                <a:cs typeface="Menlo Regular"/>
+                <a:sym typeface="Courier New"/>
+              </a:rPr>
+              <a:t>:</a:t>
             </a:r>
             <a:endParaRPr lang="en" sz="1800" dirty="0">
               <a:solidFill>
@@ -16336,7 +16813,43 @@
                 <a:cs typeface="Menlo Regular"/>
                 <a:sym typeface="Courier New"/>
               </a:rPr>
-              <a:t>"Yuck!“)</a:t>
+              <a:t>"Yuck</a:t>
+            </a:r>
+            <a:r>
+              <a:rPr lang="en" sz="1800" dirty="0" smtClean="0">
+                <a:solidFill>
+                  <a:srgbClr val="FF0000"/>
+                </a:solidFill>
+                <a:latin typeface="Menlo Regular"/>
+                <a:ea typeface="Menlo Regular"/>
+                <a:cs typeface="Menlo Regular"/>
+                <a:sym typeface="Courier New"/>
+              </a:rPr>
+              <a:t>!</a:t>
+            </a:r>
+            <a:r>
+              <a:rPr lang="en-US" sz="1800" dirty="0" smtClean="0">
+                <a:solidFill>
+                  <a:srgbClr val="FF0000"/>
+                </a:solidFill>
+                <a:latin typeface="Menlo Regular"/>
+                <a:ea typeface="Menlo Regular"/>
+                <a:cs typeface="Menlo Regular"/>
+                <a:sym typeface="Courier New"/>
+              </a:rPr>
+              <a:t>"</a:t>
+            </a:r>
+            <a:r>
+              <a:rPr lang="en" sz="1800" dirty="0" smtClean="0">
+                <a:solidFill>
+                  <a:srgbClr val="FF0000"/>
+                </a:solidFill>
+                <a:latin typeface="Menlo Regular"/>
+                <a:ea typeface="Menlo Regular"/>
+                <a:cs typeface="Menlo Regular"/>
+                <a:sym typeface="Courier New"/>
+              </a:rPr>
+              <a:t>)</a:t>
             </a:r>
             <a:endParaRPr lang="en" sz="1800" dirty="0">
               <a:solidFill>
@@ -16466,7 +16979,31 @@
                 <a:cs typeface="Menlo Regular"/>
                 <a:sym typeface="Courier New"/>
               </a:rPr>
-              <a:t>.“)</a:t>
+              <a:t>.</a:t>
+            </a:r>
+            <a:r>
+              <a:rPr lang="en-US" sz="1800" dirty="0" smtClean="0">
+                <a:solidFill>
+                  <a:srgbClr val="FF0000"/>
+                </a:solidFill>
+                <a:latin typeface="Menlo Regular"/>
+                <a:ea typeface="Menlo Regular"/>
+                <a:cs typeface="Menlo Regular"/>
+                <a:sym typeface="Courier New"/>
+              </a:rPr>
+              <a:t>"</a:t>
+            </a:r>
+            <a:r>
+              <a:rPr lang="en" sz="1800" dirty="0" smtClean="0">
+                <a:solidFill>
+                  <a:srgbClr val="FF0000"/>
+                </a:solidFill>
+                <a:latin typeface="Menlo Regular"/>
+                <a:ea typeface="Menlo Regular"/>
+                <a:cs typeface="Menlo Regular"/>
+                <a:sym typeface="Courier New"/>
+              </a:rPr>
+              <a:t>)</a:t>
             </a:r>
             <a:endParaRPr lang="en" sz="1800" dirty="0">
               <a:solidFill>
@@ -16511,13 +17048,13 @@
   <p:clrMapOvr>
     <a:masterClrMapping/>
   </p:clrMapOvr>
-  <p:transition spd="slow">
+  <p:transition xmlns:p14="http://schemas.microsoft.com/office/powerpoint/2010/main" spd="slow">
     <p:cut/>
   </p:transition>
   <p:timing>
     <p:tnLst>
       <p:par>
-        <p:cTn id="1" dur="indefinite" restart="never" nodeType="tmRoot"/>
+        <p:cTn xmlns:p14="http://schemas.microsoft.com/office/powerpoint/2010/main" id="1" dur="indefinite" restart="never" nodeType="tmRoot"/>
       </p:par>
     </p:tnLst>
   </p:timing>
@@ -16693,8 +17230,59 @@
                 <a:cs typeface="Menlo Regular"/>
                 <a:sym typeface="Courier New"/>
               </a:rPr>
-              <a:t>	print(“Yuck”)</a:t>
-            </a:r>
+              <a:t>	</a:t>
+            </a:r>
+            <a:r>
+              <a:rPr lang="en" sz="2400" dirty="0" smtClean="0">
+                <a:latin typeface="Menlo Regular"/>
+                <a:ea typeface="Menlo Regular"/>
+                <a:cs typeface="Menlo Regular"/>
+                <a:sym typeface="Courier New"/>
+              </a:rPr>
+              <a:t>print(</a:t>
+            </a:r>
+            <a:r>
+              <a:rPr lang="en-US" sz="2400" dirty="0" smtClean="0">
+                <a:latin typeface="Menlo Regular"/>
+                <a:ea typeface="Menlo Regular"/>
+                <a:cs typeface="Menlo Regular"/>
+                <a:sym typeface="Courier New"/>
+              </a:rPr>
+              <a:t>"</a:t>
+            </a:r>
+            <a:r>
+              <a:rPr lang="en" sz="2400" dirty="0" smtClean="0">
+                <a:latin typeface="Menlo Regular"/>
+                <a:ea typeface="Menlo Regular"/>
+                <a:cs typeface="Menlo Regular"/>
+                <a:sym typeface="Courier New"/>
+              </a:rPr>
+              <a:t>Yuck</a:t>
+            </a:r>
+            <a:r>
+              <a:rPr lang="en-US" sz="2400" dirty="0">
+                <a:latin typeface="Menlo Regular"/>
+                <a:ea typeface="Menlo Regular"/>
+                <a:cs typeface="Menlo Regular"/>
+                <a:sym typeface="Courier New"/>
+              </a:rPr>
+              <a:t>"</a:t>
+            </a:r>
+            <a:r>
+              <a:rPr lang="en" sz="2400" dirty="0" smtClean="0">
+                <a:latin typeface="Menlo Regular"/>
+                <a:ea typeface="Menlo Regular"/>
+                <a:cs typeface="Menlo Regular"/>
+                <a:sym typeface="Courier New"/>
+              </a:rPr>
+              <a:t>)</a:t>
+            </a:r>
+            <a:endParaRPr lang="en" sz="2400" dirty="0" smtClean="0">
+              <a:latin typeface="Menlo Regular"/>
+              <a:ea typeface="Menlo Regular"/>
+              <a:cs typeface="Menlo Regular"/>
+              <a:sym typeface="Courier New"/>
+            </a:endParaRPr>
           </a:p>
           <a:p>
             <a:pPr>
@@ -16878,7 +17466,31 @@
                 <a:cs typeface="Menlo Regular"/>
                 <a:sym typeface="Courier New"/>
               </a:rPr>
-              <a:t>"baby“</a:t>
+              <a:t>"</a:t>
+            </a:r>
+            <a:r>
+              <a:rPr lang="en" sz="2400" dirty="0" smtClean="0">
+                <a:solidFill>
+                  <a:srgbClr val="FF0000"/>
+                </a:solidFill>
+                <a:latin typeface="Menlo Regular"/>
+                <a:ea typeface="Menlo Regular"/>
+                <a:cs typeface="Menlo Regular"/>
+                <a:sym typeface="Courier New"/>
+              </a:rPr>
+              <a:t>baby</a:t>
+            </a:r>
+            <a:r>
+              <a:rPr lang="en-US" sz="2400" dirty="0" smtClean="0">
+                <a:solidFill>
+                  <a:srgbClr val="FF0000"/>
+                </a:solidFill>
+                <a:latin typeface="Menlo Regular"/>
+                <a:ea typeface="Menlo Regular"/>
+                <a:cs typeface="Menlo Regular"/>
+                <a:sym typeface="Courier New"/>
+              </a:rPr>
+              <a:t>"</a:t>
             </a:r>
             <a:r>
               <a:rPr lang="en" sz="2400" dirty="0" smtClean="0">
@@ -17032,7 +17644,31 @@
                 <a:cs typeface="Menlo Regular"/>
                 <a:sym typeface="Courier New"/>
               </a:rPr>
-              <a:t>"child“</a:t>
+              <a:t>"</a:t>
+            </a:r>
+            <a:r>
+              <a:rPr lang="en" sz="2400" dirty="0" smtClean="0">
+                <a:solidFill>
+                  <a:srgbClr val="FF0000"/>
+                </a:solidFill>
+                <a:latin typeface="Menlo Regular"/>
+                <a:ea typeface="Menlo Regular"/>
+                <a:cs typeface="Menlo Regular"/>
+                <a:sym typeface="Courier New"/>
+              </a:rPr>
+              <a:t>child</a:t>
+            </a:r>
+            <a:r>
+              <a:rPr lang="en-US" sz="2400" dirty="0" smtClean="0">
+                <a:solidFill>
+                  <a:srgbClr val="FF0000"/>
+                </a:solidFill>
+                <a:latin typeface="Menlo Regular"/>
+                <a:ea typeface="Menlo Regular"/>
+                <a:cs typeface="Menlo Regular"/>
+                <a:sym typeface="Courier New"/>
+              </a:rPr>
+              <a:t>"</a:t>
             </a:r>
             <a:r>
               <a:rPr lang="en" sz="2400" dirty="0" smtClean="0">
@@ -17132,6 +17768,18 @@
               <a:t>adult</a:t>
             </a:r>
             <a:r>
+              <a:rPr lang="en-US" sz="2400" dirty="0">
+                <a:solidFill>
+                  <a:srgbClr val="FF0000"/>
+                </a:solidFill>
+                <a:latin typeface="Menlo Regular"/>
+                <a:ea typeface="Menlo Regular"/>
+                <a:cs typeface="Menlo Regular"/>
+                <a:sym typeface="Courier New"/>
+              </a:rPr>
+              <a:t>"</a:t>
+            </a:r>
+            <a:r>
               <a:rPr lang="en" sz="2400" dirty="0" smtClean="0">
                 <a:solidFill>
                   <a:srgbClr val="FF0000"/>
@@ -17141,7 +17789,7 @@
                 <a:cs typeface="Menlo Regular"/>
                 <a:sym typeface="Courier New"/>
               </a:rPr>
-              <a:t>“)</a:t>
+              <a:t>)</a:t>
             </a:r>
             <a:endParaRPr lang="en" sz="2400" dirty="0">
               <a:solidFill>
@@ -17177,13 +17825,13 @@
   <p:clrMapOvr>
     <a:masterClrMapping/>
   </p:clrMapOvr>
-  <p:transition spd="slow">
+  <p:transition xmlns:p14="http://schemas.microsoft.com/office/powerpoint/2010/main" spd="slow">
     <p:cut/>
   </p:transition>
   <p:timing>
     <p:tnLst>
       <p:par>
-        <p:cTn id="1" dur="indefinite" restart="never" nodeType="tmRoot"/>
+        <p:cTn xmlns:p14="http://schemas.microsoft.com/office/powerpoint/2010/main" id="1" dur="indefinite" restart="never" nodeType="tmRoot"/>
       </p:par>
     </p:tnLst>
   </p:timing>
@@ -17706,13 +18354,13 @@
   <p:clrMapOvr>
     <a:masterClrMapping/>
   </p:clrMapOvr>
-  <p:transition spd="slow">
+  <p:transition xmlns:p14="http://schemas.microsoft.com/office/powerpoint/2010/main" spd="slow">
     <p:cut/>
   </p:transition>
   <p:timing>
     <p:tnLst>
       <p:par>
-        <p:cTn id="1" dur="indefinite" restart="never" nodeType="tmRoot"/>
+        <p:cTn xmlns:p14="http://schemas.microsoft.com/office/powerpoint/2010/main" id="1" dur="indefinite" restart="never" nodeType="tmRoot"/>
       </p:par>
     </p:tnLst>
   </p:timing>
@@ -17833,7 +18481,7 @@
               <a:buNone/>
             </a:pPr>
             <a:r>
-              <a:rPr lang="en" sz="2400" dirty="0" smtClean="0">
+              <a:rPr lang="en" sz="2200" dirty="0" smtClean="0">
                 <a:solidFill>
                   <a:srgbClr val="000000"/>
                 </a:solidFill>
@@ -17843,7 +18491,7 @@
               <a:t>There is no “do x until y” loop in Python, but </a:t>
             </a:r>
             <a:r>
-              <a:rPr lang="en" sz="2400" i="1" dirty="0" smtClean="0">
+              <a:rPr lang="en" sz="2200" i="1" dirty="0" smtClean="0">
                 <a:solidFill>
                   <a:schemeClr val="bg2"/>
                 </a:solidFill>
@@ -17853,7 +18501,7 @@
               <a:t>while </a:t>
             </a:r>
             <a:r>
-              <a:rPr lang="en" sz="2400" dirty="0" smtClean="0">
+              <a:rPr lang="en" sz="2200" dirty="0" smtClean="0">
                 <a:solidFill>
                   <a:srgbClr val="000000"/>
                 </a:solidFill>
@@ -17862,7 +18510,7 @@
               </a:rPr>
               <a:t>loops can be modified to continue until a condition is met:</a:t>
             </a:r>
-            <a:endParaRPr lang="en-US" sz="2400" i="1" dirty="0" smtClean="0">
+            <a:endParaRPr lang="en-US" sz="2200" i="1" dirty="0" smtClean="0">
               <a:solidFill>
                 <a:srgbClr val="666666"/>
               </a:solidFill>
@@ -17874,7 +18522,7 @@
             <a:pPr lvl="0">
               <a:buNone/>
             </a:pPr>
-            <a:endParaRPr lang="en-US" sz="2400" b="1" dirty="0" smtClean="0">
+            <a:endParaRPr lang="en-US" sz="2200" b="1" dirty="0" smtClean="0">
               <a:solidFill>
                 <a:srgbClr val="0B5394"/>
               </a:solidFill>
@@ -17892,7 +18540,7 @@
               <a:buNone/>
             </a:pPr>
             <a:r>
-              <a:rPr lang="en" sz="2400" dirty="0" smtClean="0">
+              <a:rPr lang="en" sz="2200" dirty="0" smtClean="0">
                 <a:solidFill>
                   <a:schemeClr val="tx1"/>
                 </a:solidFill>
@@ -17904,7 +18552,7 @@
               <a:t>counter </a:t>
             </a:r>
             <a:r>
-              <a:rPr lang="en" sz="2400" dirty="0">
+              <a:rPr lang="en" sz="2200" dirty="0">
                 <a:solidFill>
                   <a:schemeClr val="tx1"/>
                 </a:solidFill>
@@ -17916,7 +18564,7 @@
               <a:t>= </a:t>
             </a:r>
             <a:r>
-              <a:rPr lang="en" sz="2400" dirty="0">
+              <a:rPr lang="en" sz="2200" dirty="0">
                 <a:solidFill>
                   <a:srgbClr val="11889C"/>
                 </a:solidFill>
@@ -17936,7 +18584,7 @@
               <a:buNone/>
             </a:pPr>
             <a:r>
-              <a:rPr lang="en-US" sz="2400" dirty="0" smtClean="0">
+              <a:rPr lang="en-US" sz="2200" dirty="0" smtClean="0">
                 <a:solidFill>
                   <a:schemeClr val="tx1"/>
                 </a:solidFill>
@@ -17953,7 +18601,7 @@
               <a:buNone/>
             </a:pPr>
             <a:r>
-              <a:rPr lang="en-US" sz="2400" dirty="0" smtClean="0">
+              <a:rPr lang="en-US" sz="2200" dirty="0" smtClean="0">
                 <a:solidFill>
                   <a:schemeClr val="tx1"/>
                 </a:solidFill>
@@ -17965,7 +18613,7 @@
               <a:t>while True:	</a:t>
             </a:r>
             <a:r>
-              <a:rPr lang="en-US" sz="2400" dirty="0">
+              <a:rPr lang="en-US" sz="2200" dirty="0">
                 <a:solidFill>
                   <a:schemeClr val="tx1"/>
                 </a:solidFill>
@@ -17982,7 +18630,7 @@
               <a:buNone/>
             </a:pPr>
             <a:r>
-              <a:rPr lang="en-US" sz="2400" dirty="0">
+              <a:rPr lang="en-US" sz="2200" dirty="0">
                 <a:solidFill>
                   <a:schemeClr val="tx1"/>
                 </a:solidFill>
@@ -17994,7 +18642,7 @@
               <a:t>	counter &lt;= 5</a:t>
             </a:r>
             <a:r>
-              <a:rPr lang="en-US" sz="2400" dirty="0" smtClean="0">
+              <a:rPr lang="en-US" sz="2200" dirty="0" smtClean="0">
                 <a:solidFill>
                   <a:schemeClr val="tx1"/>
                 </a:solidFill>
@@ -18014,7 +18662,7 @@
               <a:buNone/>
             </a:pPr>
             <a:r>
-              <a:rPr lang="en-US" sz="2400" dirty="0">
+              <a:rPr lang="en-US" sz="2200" dirty="0">
                 <a:solidFill>
                   <a:schemeClr val="tx1"/>
                 </a:solidFill>
@@ -18026,7 +18674,7 @@
               <a:t>		</a:t>
             </a:r>
             <a:r>
-              <a:rPr lang="en-US" sz="2400" dirty="0" smtClean="0">
+              <a:rPr lang="en-US" sz="2200" dirty="0" smtClean="0">
                 <a:solidFill>
                   <a:schemeClr val="tx1"/>
                 </a:solidFill>
@@ -18046,7 +18694,7 @@
               <a:buNone/>
             </a:pPr>
             <a:r>
-              <a:rPr lang="en-US" sz="2400" dirty="0" smtClean="0">
+              <a:rPr lang="en-US" sz="2200" dirty="0" smtClean="0">
                 <a:solidFill>
                   <a:schemeClr val="tx1"/>
                 </a:solidFill>
@@ -18066,7 +18714,7 @@
               <a:buNone/>
             </a:pPr>
             <a:r>
-              <a:rPr lang="en-US" sz="2400" dirty="0">
+              <a:rPr lang="en-US" sz="2200" dirty="0">
                 <a:solidFill>
                   <a:schemeClr val="tx1"/>
                 </a:solidFill>
@@ -18078,7 +18726,7 @@
               <a:t>	</a:t>
             </a:r>
             <a:r>
-              <a:rPr lang="en-US" sz="2400" dirty="0" smtClean="0">
+              <a:rPr lang="en-US" sz="2200" dirty="0" smtClean="0">
                 <a:solidFill>
                   <a:schemeClr val="tx1"/>
                 </a:solidFill>
@@ -18087,10 +18735,18 @@
                 <a:cs typeface="Menlo Regular"/>
                 <a:sym typeface="Courier New"/>
               </a:rPr>
-              <a:t>if </a:t>
-            </a:r>
-            <a:r>
-              <a:rPr lang="en-US" sz="2400" smtClean="0">
+              <a:t>if counter &gt; 5:</a:t>
+            </a:r>
+          </a:p>
+          <a:p>
+            <a:pPr lvl="0" rtl="0">
+              <a:spcBef>
+                <a:spcPts val="0"/>
+              </a:spcBef>
+              <a:buNone/>
+            </a:pPr>
+            <a:r>
+              <a:rPr lang="en-US" sz="2200" dirty="0">
                 <a:solidFill>
                   <a:schemeClr val="tx1"/>
                 </a:solidFill>
@@ -18099,10 +18755,10 @@
                 <a:cs typeface="Menlo Regular"/>
                 <a:sym typeface="Courier New"/>
               </a:rPr>
-              <a:t>counter &gt; 5</a:t>
-            </a:r>
-            <a:r>
-              <a:rPr lang="en-US" sz="2400" dirty="0" smtClean="0">
+              <a:t>	</a:t>
+            </a:r>
+            <a:r>
+              <a:rPr lang="en-US" sz="2200" dirty="0" smtClean="0">
                 <a:solidFill>
                   <a:schemeClr val="tx1"/>
                 </a:solidFill>
@@ -18111,8 +18767,9 @@
                 <a:cs typeface="Menlo Regular"/>
                 <a:sym typeface="Courier New"/>
               </a:rPr>
-              <a:t>:</a:t>
-            </a:r>
+              <a:t>	break</a:t>
+            </a:r>
+            <a:endParaRPr sz="2200" dirty="0"/>
           </a:p>
           <a:p>
             <a:pPr lvl="0" rtl="0">
@@ -18121,40 +18778,7 @@
               </a:spcBef>
               <a:buNone/>
             </a:pPr>
-            <a:r>
-              <a:rPr lang="en-US" sz="2400" dirty="0">
-                <a:solidFill>
-                  <a:schemeClr val="tx1"/>
-                </a:solidFill>
-                <a:latin typeface="Menlo Regular"/>
-                <a:ea typeface="Menlo Regular"/>
-                <a:cs typeface="Menlo Regular"/>
-                <a:sym typeface="Courier New"/>
-              </a:rPr>
-              <a:t>	</a:t>
-            </a:r>
-            <a:r>
-              <a:rPr lang="en-US" sz="2400" dirty="0" smtClean="0">
-                <a:solidFill>
-                  <a:schemeClr val="tx1"/>
-                </a:solidFill>
-                <a:latin typeface="Menlo Regular"/>
-                <a:ea typeface="Menlo Regular"/>
-                <a:cs typeface="Menlo Regular"/>
-                <a:sym typeface="Courier New"/>
-              </a:rPr>
-              <a:t>	break</a:t>
-            </a:r>
-            <a:endParaRPr dirty="0"/>
-          </a:p>
-          <a:p>
-            <a:pPr lvl="0" rtl="0">
-              <a:spcBef>
-                <a:spcPts val="0"/>
-              </a:spcBef>
-              <a:buNone/>
-            </a:pPr>
-            <a:endParaRPr dirty="0"/>
+            <a:endParaRPr sz="2200" dirty="0"/>
           </a:p>
           <a:p>
             <a:pPr>
@@ -18164,73 +18788,57 @@
               <a:buNone/>
             </a:pPr>
             <a:r>
-              <a:rPr lang="en" sz="2400" b="1" dirty="0" smtClean="0">
+              <a:rPr lang="en" sz="2200" b="1" dirty="0" smtClean="0">
                 <a:solidFill>
                   <a:srgbClr val="000000"/>
                 </a:solidFill>
-                <a:latin typeface="Open Sans"/>
-                <a:ea typeface="Open Sans"/>
-                <a:cs typeface="Open Sans"/>
                 <a:sym typeface="Open Sans"/>
               </a:rPr>
               <a:t>Remember</a:t>
             </a:r>
             <a:r>
-              <a:rPr lang="en" sz="2400" b="1" dirty="0">
+              <a:rPr lang="en" sz="2200" b="1" dirty="0">
                 <a:solidFill>
                   <a:srgbClr val="000000"/>
                 </a:solidFill>
-                <a:latin typeface="Open Sans"/>
-                <a:ea typeface="Open Sans"/>
-                <a:cs typeface="Open Sans"/>
                 <a:sym typeface="Open Sans"/>
               </a:rPr>
               <a:t>: </a:t>
             </a:r>
             <a:r>
-              <a:rPr lang="en" sz="2400" dirty="0">
+              <a:rPr lang="en" sz="2200" dirty="0">
                 <a:solidFill>
                   <a:srgbClr val="FF0000"/>
                 </a:solidFill>
                 <a:latin typeface="Menlo Regular"/>
-                <a:ea typeface="Open Sans"/>
                 <a:cs typeface="Menlo Regular"/>
                 <a:sym typeface="Open Sans"/>
               </a:rPr>
               <a:t>=</a:t>
             </a:r>
             <a:r>
-              <a:rPr lang="en" sz="2400" b="1" dirty="0">
+              <a:rPr lang="en" sz="2200" b="1" dirty="0">
                 <a:solidFill>
                   <a:srgbClr val="000000"/>
                 </a:solidFill>
-                <a:latin typeface="Open Sans"/>
-                <a:ea typeface="Open Sans"/>
-                <a:cs typeface="Open Sans"/>
                 <a:sym typeface="Open Sans"/>
               </a:rPr>
               <a:t> is assignment, </a:t>
             </a:r>
             <a:r>
-              <a:rPr lang="en" sz="2400" dirty="0">
+              <a:rPr lang="en" sz="2200" dirty="0">
                 <a:solidFill>
                   <a:srgbClr val="FF0000"/>
                 </a:solidFill>
-                <a:latin typeface="Open Sans"/>
-                <a:ea typeface="Open Sans"/>
-                <a:cs typeface="Open Sans"/>
                 <a:sym typeface="Open Sans"/>
               </a:rPr>
               <a:t>==</a:t>
             </a:r>
             <a:r>
-              <a:rPr lang="en" sz="2400" b="1" dirty="0">
+              <a:rPr lang="en" sz="2200" b="1" dirty="0">
                 <a:solidFill>
                   <a:srgbClr val="000000"/>
                 </a:solidFill>
-                <a:latin typeface="Open Sans"/>
-                <a:ea typeface="Open Sans"/>
-                <a:cs typeface="Open Sans"/>
                 <a:sym typeface="Open Sans"/>
               </a:rPr>
               <a:t> is equivalence</a:t>
@@ -18243,13 +18851,13 @@
   <p:clrMapOvr>
     <a:masterClrMapping/>
   </p:clrMapOvr>
-  <p:transition spd="slow">
+  <p:transition xmlns:p14="http://schemas.microsoft.com/office/powerpoint/2010/main" spd="slow">
     <p:cut/>
   </p:transition>
   <p:timing>
     <p:tnLst>
       <p:par>
-        <p:cTn id="1" dur="indefinite" restart="never" nodeType="tmRoot"/>
+        <p:cTn xmlns:p14="http://schemas.microsoft.com/office/powerpoint/2010/main" id="1" dur="indefinite" restart="never" nodeType="tmRoot"/>
       </p:par>
     </p:tnLst>
   </p:timing>
@@ -18377,16 +18985,20 @@
                 <a:cs typeface="Menlo Regular"/>
                 <a:sym typeface="Courier New"/>
               </a:rPr>
-              <a:t>lphabet = “abcdefghijklmnopqrstuvwxyz”</a:t>
-            </a:r>
-          </a:p>
-          <a:p>
-            <a:pPr lvl="0" rtl="0">
-              <a:spcBef>
-                <a:spcPts val="0"/>
-              </a:spcBef>
-              <a:buNone/>
-            </a:pPr>
+              <a:t>lphabet = </a:t>
+            </a:r>
+            <a:r>
+              <a:rPr lang="en-US" sz="2400" dirty="0" smtClean="0">
+                <a:solidFill>
+                  <a:schemeClr val="tx1"/>
+                </a:solidFill>
+                <a:latin typeface="Menlo Regular"/>
+                <a:ea typeface="Menlo Regular"/>
+                <a:cs typeface="Menlo Regular"/>
+                <a:sym typeface="Courier New"/>
+              </a:rPr>
+              <a:t>"</a:t>
+            </a:r>
             <a:r>
               <a:rPr lang="en" sz="2400" dirty="0" smtClean="0">
                 <a:solidFill>
@@ -18397,18 +19009,10 @@
                 <a:cs typeface="Menlo Regular"/>
                 <a:sym typeface="Courier New"/>
               </a:rPr>
-              <a:t>&gt;&gt;&gt; alphabet[1]</a:t>
-            </a:r>
-          </a:p>
-          <a:p>
-            <a:pPr lvl="0" rtl="0">
-              <a:spcBef>
-                <a:spcPts val="0"/>
-              </a:spcBef>
-              <a:buNone/>
-            </a:pPr>
-            <a:r>
-              <a:rPr lang="en" sz="2400" dirty="0" smtClean="0">
+              <a:t>abcdefghijklmnopqrstuvwxyz</a:t>
+            </a:r>
+            <a:r>
+              <a:rPr lang="en-US" sz="2400" dirty="0">
                 <a:solidFill>
                   <a:schemeClr val="tx1"/>
                 </a:solidFill>
@@ -18417,96 +19021,8 @@
                 <a:cs typeface="Menlo Regular"/>
                 <a:sym typeface="Courier New"/>
               </a:rPr>
-              <a:t>“b”</a:t>
-            </a:r>
-          </a:p>
-          <a:p>
-            <a:pPr lvl="0" rtl="0">
-              <a:spcBef>
-                <a:spcPts val="0"/>
-              </a:spcBef>
-              <a:buNone/>
-            </a:pPr>
-            <a:r>
-              <a:rPr lang="en" sz="2400" dirty="0" smtClean="0">
-                <a:solidFill>
-                  <a:schemeClr val="tx1"/>
-                </a:solidFill>
-                <a:latin typeface="Menlo Regular"/>
-                <a:ea typeface="Menlo Regular"/>
-                <a:cs typeface="Menlo Regular"/>
-                <a:sym typeface="Courier New"/>
-              </a:rPr>
-              <a:t>&gt;&gt;&gt; alphabet[2:7]</a:t>
-            </a:r>
-          </a:p>
-          <a:p>
-            <a:pPr lvl="0" rtl="0">
-              <a:spcBef>
-                <a:spcPts val="0"/>
-              </a:spcBef>
-              <a:buNone/>
-            </a:pPr>
-            <a:r>
-              <a:rPr lang="en" sz="2400" dirty="0" smtClean="0">
-                <a:solidFill>
-                  <a:schemeClr val="tx1"/>
-                </a:solidFill>
-                <a:latin typeface="Menlo Regular"/>
-                <a:ea typeface="Menlo Regular"/>
-                <a:cs typeface="Menlo Regular"/>
-                <a:sym typeface="Courier New"/>
-              </a:rPr>
-              <a:t>“cdefg”</a:t>
-            </a:r>
-          </a:p>
-          <a:p>
-            <a:pPr lvl="0" rtl="0">
-              <a:spcBef>
-                <a:spcPts val="0"/>
-              </a:spcBef>
-              <a:buNone/>
-            </a:pPr>
-            <a:r>
-              <a:rPr lang="en" sz="2400" dirty="0" smtClean="0">
-                <a:solidFill>
-                  <a:schemeClr val="tx1"/>
-                </a:solidFill>
-                <a:latin typeface="Menlo Regular"/>
-                <a:ea typeface="Menlo Regular"/>
-                <a:cs typeface="Menlo Regular"/>
-                <a:sym typeface="Courier New"/>
-              </a:rPr>
-              <a:t>&gt;&gt;&gt; alphabet[-2:]</a:t>
-            </a:r>
-          </a:p>
-          <a:p>
-            <a:pPr lvl="0" rtl="0">
-              <a:spcBef>
-                <a:spcPts val="0"/>
-              </a:spcBef>
-              <a:buNone/>
-            </a:pPr>
-            <a:r>
-              <a:rPr lang="en" sz="2400" dirty="0" smtClean="0">
-                <a:solidFill>
-                  <a:schemeClr val="tx1"/>
-                </a:solidFill>
-                <a:latin typeface="Menlo Regular"/>
-                <a:ea typeface="Menlo Regular"/>
-                <a:cs typeface="Menlo Regular"/>
-                <a:sym typeface="Courier New"/>
-              </a:rPr>
-              <a:t>“yz”</a:t>
-            </a:r>
-          </a:p>
-          <a:p>
-            <a:pPr lvl="0" rtl="0">
-              <a:spcBef>
-                <a:spcPts val="0"/>
-              </a:spcBef>
-              <a:buNone/>
-            </a:pPr>
+              <a:t>"</a:t>
+            </a:r>
             <a:endParaRPr lang="en" sz="2400" dirty="0" smtClean="0">
               <a:solidFill>
                 <a:schemeClr val="tx1"/>
@@ -18534,7 +19050,7 @@
                 <a:cs typeface="Menlo Regular"/>
                 <a:sym typeface="Courier New"/>
               </a:rPr>
-              <a:t>&gt;&gt;&gt; list = [“a”, “b”, “c”, “d”, “e”]</a:t>
+              <a:t>&gt;&gt;&gt; alphabet[1]</a:t>
             </a:r>
           </a:p>
           <a:p>
@@ -18545,6 +19061,18 @@
               <a:buNone/>
             </a:pPr>
             <a:r>
+              <a:rPr lang="en-US" sz="2400" dirty="0">
+                <a:solidFill>
+                  <a:schemeClr val="tx1"/>
+                </a:solidFill>
+                <a:latin typeface="Menlo Regular"/>
+                <a:ea typeface="Menlo Regular"/>
+                <a:cs typeface="Menlo Regular"/>
+                <a:sym typeface="Courier New"/>
+              </a:rPr>
+              <a:t>"</a:t>
+            </a:r>
+            <a:r>
               <a:rPr lang="en" sz="2400" dirty="0" smtClean="0">
                 <a:solidFill>
                   <a:schemeClr val="tx1"/>
@@ -18554,6 +19082,491 @@
                 <a:cs typeface="Menlo Regular"/>
                 <a:sym typeface="Courier New"/>
               </a:rPr>
+              <a:t>b</a:t>
+            </a:r>
+            <a:r>
+              <a:rPr lang="en-US" sz="2400" dirty="0" smtClean="0">
+                <a:solidFill>
+                  <a:schemeClr val="tx1"/>
+                </a:solidFill>
+                <a:latin typeface="Menlo Regular"/>
+                <a:ea typeface="Menlo Regular"/>
+                <a:cs typeface="Menlo Regular"/>
+                <a:sym typeface="Courier New"/>
+              </a:rPr>
+              <a:t>"</a:t>
+            </a:r>
+            <a:endParaRPr lang="en" sz="2400" dirty="0" smtClean="0">
+              <a:solidFill>
+                <a:schemeClr val="tx1"/>
+              </a:solidFill>
+              <a:latin typeface="Menlo Regular"/>
+              <a:ea typeface="Menlo Regular"/>
+              <a:cs typeface="Menlo Regular"/>
+              <a:sym typeface="Courier New"/>
+            </a:endParaRPr>
+          </a:p>
+          <a:p>
+            <a:pPr lvl="0" rtl="0">
+              <a:spcBef>
+                <a:spcPts val="0"/>
+              </a:spcBef>
+              <a:buNone/>
+            </a:pPr>
+            <a:r>
+              <a:rPr lang="en" sz="2400" dirty="0" smtClean="0">
+                <a:solidFill>
+                  <a:schemeClr val="tx1"/>
+                </a:solidFill>
+                <a:latin typeface="Menlo Regular"/>
+                <a:ea typeface="Menlo Regular"/>
+                <a:cs typeface="Menlo Regular"/>
+                <a:sym typeface="Courier New"/>
+              </a:rPr>
+              <a:t>&gt;&gt;&gt; alphabet[2:7]</a:t>
+            </a:r>
+          </a:p>
+          <a:p>
+            <a:pPr lvl="0" rtl="0">
+              <a:spcBef>
+                <a:spcPts val="0"/>
+              </a:spcBef>
+              <a:buNone/>
+            </a:pPr>
+            <a:r>
+              <a:rPr lang="en-US" sz="2400" dirty="0">
+                <a:solidFill>
+                  <a:schemeClr val="tx1"/>
+                </a:solidFill>
+                <a:latin typeface="Menlo Regular"/>
+                <a:ea typeface="Menlo Regular"/>
+                <a:cs typeface="Menlo Regular"/>
+                <a:sym typeface="Courier New"/>
+              </a:rPr>
+              <a:t>"</a:t>
+            </a:r>
+            <a:r>
+              <a:rPr lang="en" sz="2400" dirty="0" smtClean="0">
+                <a:solidFill>
+                  <a:schemeClr val="tx1"/>
+                </a:solidFill>
+                <a:latin typeface="Menlo Regular"/>
+                <a:ea typeface="Menlo Regular"/>
+                <a:cs typeface="Menlo Regular"/>
+                <a:sym typeface="Courier New"/>
+              </a:rPr>
+              <a:t>cdefg</a:t>
+            </a:r>
+            <a:r>
+              <a:rPr lang="en-US" sz="2400" dirty="0">
+                <a:solidFill>
+                  <a:schemeClr val="tx1"/>
+                </a:solidFill>
+                <a:latin typeface="Menlo Regular"/>
+                <a:ea typeface="Menlo Regular"/>
+                <a:cs typeface="Menlo Regular"/>
+                <a:sym typeface="Courier New"/>
+              </a:rPr>
+              <a:t>"</a:t>
+            </a:r>
+            <a:endParaRPr lang="en" sz="2400" dirty="0" smtClean="0">
+              <a:solidFill>
+                <a:schemeClr val="tx1"/>
+              </a:solidFill>
+              <a:latin typeface="Menlo Regular"/>
+              <a:ea typeface="Menlo Regular"/>
+              <a:cs typeface="Menlo Regular"/>
+              <a:sym typeface="Courier New"/>
+            </a:endParaRPr>
+          </a:p>
+          <a:p>
+            <a:pPr lvl="0" rtl="0">
+              <a:spcBef>
+                <a:spcPts val="0"/>
+              </a:spcBef>
+              <a:buNone/>
+            </a:pPr>
+            <a:r>
+              <a:rPr lang="en" sz="2400" dirty="0" smtClean="0">
+                <a:solidFill>
+                  <a:schemeClr val="tx1"/>
+                </a:solidFill>
+                <a:latin typeface="Menlo Regular"/>
+                <a:ea typeface="Menlo Regular"/>
+                <a:cs typeface="Menlo Regular"/>
+                <a:sym typeface="Courier New"/>
+              </a:rPr>
+              <a:t>&gt;&gt;&gt; alphabet[-2:]</a:t>
+            </a:r>
+          </a:p>
+          <a:p>
+            <a:pPr lvl="0" rtl="0">
+              <a:spcBef>
+                <a:spcPts val="0"/>
+              </a:spcBef>
+              <a:buNone/>
+            </a:pPr>
+            <a:r>
+              <a:rPr lang="en-US" sz="2400" dirty="0" smtClean="0">
+                <a:solidFill>
+                  <a:schemeClr val="tx1"/>
+                </a:solidFill>
+                <a:latin typeface="Menlo Regular"/>
+                <a:ea typeface="Menlo Regular"/>
+                <a:cs typeface="Menlo Regular"/>
+                <a:sym typeface="Courier New"/>
+              </a:rPr>
+              <a:t>"</a:t>
+            </a:r>
+            <a:r>
+              <a:rPr lang="en" sz="2400" dirty="0" smtClean="0">
+                <a:solidFill>
+                  <a:schemeClr val="tx1"/>
+                </a:solidFill>
+                <a:latin typeface="Menlo Regular"/>
+                <a:ea typeface="Menlo Regular"/>
+                <a:cs typeface="Menlo Regular"/>
+                <a:sym typeface="Courier New"/>
+              </a:rPr>
+              <a:t>yz</a:t>
+            </a:r>
+            <a:r>
+              <a:rPr lang="en-US" sz="2400" dirty="0">
+                <a:solidFill>
+                  <a:schemeClr val="tx1"/>
+                </a:solidFill>
+                <a:latin typeface="Menlo Regular"/>
+                <a:ea typeface="Menlo Regular"/>
+                <a:cs typeface="Menlo Regular"/>
+                <a:sym typeface="Courier New"/>
+              </a:rPr>
+              <a:t>"</a:t>
+            </a:r>
+            <a:endParaRPr lang="en" sz="2400" dirty="0" smtClean="0">
+              <a:solidFill>
+                <a:schemeClr val="tx1"/>
+              </a:solidFill>
+              <a:latin typeface="Menlo Regular"/>
+              <a:ea typeface="Menlo Regular"/>
+              <a:cs typeface="Menlo Regular"/>
+              <a:sym typeface="Courier New"/>
+            </a:endParaRPr>
+          </a:p>
+          <a:p>
+            <a:pPr lvl="0" rtl="0">
+              <a:spcBef>
+                <a:spcPts val="0"/>
+              </a:spcBef>
+              <a:buNone/>
+            </a:pPr>
+            <a:endParaRPr lang="en" sz="2400" dirty="0" smtClean="0">
+              <a:solidFill>
+                <a:schemeClr val="tx1"/>
+              </a:solidFill>
+              <a:latin typeface="Menlo Regular"/>
+              <a:ea typeface="Menlo Regular"/>
+              <a:cs typeface="Menlo Regular"/>
+              <a:sym typeface="Courier New"/>
+            </a:endParaRPr>
+          </a:p>
+          <a:p>
+            <a:pPr lvl="0" rtl="0">
+              <a:spcBef>
+                <a:spcPts val="0"/>
+              </a:spcBef>
+              <a:buNone/>
+            </a:pPr>
+            <a:r>
+              <a:rPr lang="en" sz="2400" dirty="0" smtClean="0">
+                <a:solidFill>
+                  <a:schemeClr val="tx1"/>
+                </a:solidFill>
+                <a:latin typeface="Menlo Regular"/>
+                <a:ea typeface="Menlo Regular"/>
+                <a:cs typeface="Menlo Regular"/>
+                <a:sym typeface="Courier New"/>
+              </a:rPr>
+              <a:t>&gt;&gt;&gt; list = </a:t>
+            </a:r>
+            <a:r>
+              <a:rPr lang="en" sz="2400" dirty="0" smtClean="0">
+                <a:solidFill>
+                  <a:schemeClr val="tx1"/>
+                </a:solidFill>
+                <a:latin typeface="Menlo Regular"/>
+                <a:ea typeface="Menlo Regular"/>
+                <a:cs typeface="Menlo Regular"/>
+                <a:sym typeface="Courier New"/>
+              </a:rPr>
+              <a:t>[</a:t>
+            </a:r>
+            <a:r>
+              <a:rPr lang="en-US" sz="2400" dirty="0" smtClean="0">
+                <a:solidFill>
+                  <a:schemeClr val="tx1"/>
+                </a:solidFill>
+                <a:latin typeface="Menlo Regular"/>
+                <a:ea typeface="Menlo Regular"/>
+                <a:cs typeface="Menlo Regular"/>
+                <a:sym typeface="Courier New"/>
+              </a:rPr>
+              <a:t>"</a:t>
+            </a:r>
+            <a:r>
+              <a:rPr lang="en" sz="2400" dirty="0" smtClean="0">
+                <a:solidFill>
+                  <a:schemeClr val="tx1"/>
+                </a:solidFill>
+                <a:latin typeface="Menlo Regular"/>
+                <a:ea typeface="Menlo Regular"/>
+                <a:cs typeface="Menlo Regular"/>
+                <a:sym typeface="Courier New"/>
+              </a:rPr>
+              <a:t>a</a:t>
+            </a:r>
+            <a:r>
+              <a:rPr lang="en-US" sz="2400" dirty="0">
+                <a:solidFill>
+                  <a:schemeClr val="tx1"/>
+                </a:solidFill>
+                <a:latin typeface="Menlo Regular"/>
+                <a:ea typeface="Menlo Regular"/>
+                <a:cs typeface="Menlo Regular"/>
+                <a:sym typeface="Courier New"/>
+              </a:rPr>
+              <a:t>"</a:t>
+            </a:r>
+            <a:r>
+              <a:rPr lang="en" sz="2400" dirty="0" smtClean="0">
+                <a:solidFill>
+                  <a:schemeClr val="tx1"/>
+                </a:solidFill>
+                <a:latin typeface="Menlo Regular"/>
+                <a:ea typeface="Menlo Regular"/>
+                <a:cs typeface="Menlo Regular"/>
+                <a:sym typeface="Courier New"/>
+              </a:rPr>
+              <a:t>, </a:t>
+            </a:r>
+            <a:r>
+              <a:rPr lang="en-US" sz="2400" dirty="0">
+                <a:solidFill>
+                  <a:schemeClr val="tx1"/>
+                </a:solidFill>
+                <a:latin typeface="Menlo Regular"/>
+                <a:ea typeface="Menlo Regular"/>
+                <a:cs typeface="Menlo Regular"/>
+                <a:sym typeface="Courier New"/>
+              </a:rPr>
+              <a:t>"</a:t>
+            </a:r>
+            <a:r>
+              <a:rPr lang="en" sz="2400" dirty="0" smtClean="0">
+                <a:solidFill>
+                  <a:schemeClr val="tx1"/>
+                </a:solidFill>
+                <a:latin typeface="Menlo Regular"/>
+                <a:ea typeface="Menlo Regular"/>
+                <a:cs typeface="Menlo Regular"/>
+                <a:sym typeface="Courier New"/>
+              </a:rPr>
+              <a:t>b</a:t>
+            </a:r>
+            <a:r>
+              <a:rPr lang="en-US" sz="2400" dirty="0">
+                <a:solidFill>
+                  <a:schemeClr val="tx1"/>
+                </a:solidFill>
+                <a:latin typeface="Menlo Regular"/>
+                <a:ea typeface="Menlo Regular"/>
+                <a:cs typeface="Menlo Regular"/>
+                <a:sym typeface="Courier New"/>
+              </a:rPr>
+              <a:t>"</a:t>
+            </a:r>
+            <a:r>
+              <a:rPr lang="en" sz="2400" dirty="0" smtClean="0">
+                <a:solidFill>
+                  <a:schemeClr val="tx1"/>
+                </a:solidFill>
+                <a:latin typeface="Menlo Regular"/>
+                <a:ea typeface="Menlo Regular"/>
+                <a:cs typeface="Menlo Regular"/>
+                <a:sym typeface="Courier New"/>
+              </a:rPr>
+              <a:t>, </a:t>
+            </a:r>
+            <a:r>
+              <a:rPr lang="en-US" sz="2400" dirty="0">
+                <a:solidFill>
+                  <a:schemeClr val="tx1"/>
+                </a:solidFill>
+                <a:latin typeface="Menlo Regular"/>
+                <a:ea typeface="Menlo Regular"/>
+                <a:cs typeface="Menlo Regular"/>
+                <a:sym typeface="Courier New"/>
+              </a:rPr>
+              <a:t>"</a:t>
+            </a:r>
+            <a:r>
+              <a:rPr lang="en" sz="2400" dirty="0" smtClean="0">
+                <a:solidFill>
+                  <a:schemeClr val="tx1"/>
+                </a:solidFill>
+                <a:latin typeface="Menlo Regular"/>
+                <a:ea typeface="Menlo Regular"/>
+                <a:cs typeface="Menlo Regular"/>
+                <a:sym typeface="Courier New"/>
+              </a:rPr>
+              <a:t>c</a:t>
+            </a:r>
+            <a:r>
+              <a:rPr lang="en-US" sz="2400" dirty="0">
+                <a:solidFill>
+                  <a:schemeClr val="tx1"/>
+                </a:solidFill>
+                <a:latin typeface="Menlo Regular"/>
+                <a:ea typeface="Menlo Regular"/>
+                <a:cs typeface="Menlo Regular"/>
+                <a:sym typeface="Courier New"/>
+              </a:rPr>
+              <a:t>"</a:t>
+            </a:r>
+            <a:r>
+              <a:rPr lang="en" sz="2400" dirty="0" smtClean="0">
+                <a:solidFill>
+                  <a:schemeClr val="tx1"/>
+                </a:solidFill>
+                <a:latin typeface="Menlo Regular"/>
+                <a:ea typeface="Menlo Regular"/>
+                <a:cs typeface="Menlo Regular"/>
+                <a:sym typeface="Courier New"/>
+              </a:rPr>
+              <a:t>, </a:t>
+            </a:r>
+            <a:r>
+              <a:rPr lang="en-US" sz="2400" dirty="0">
+                <a:solidFill>
+                  <a:schemeClr val="tx1"/>
+                </a:solidFill>
+                <a:latin typeface="Menlo Regular"/>
+                <a:ea typeface="Menlo Regular"/>
+                <a:cs typeface="Menlo Regular"/>
+                <a:sym typeface="Courier New"/>
+              </a:rPr>
+              <a:t>"</a:t>
+            </a:r>
+            <a:r>
+              <a:rPr lang="en" sz="2400" dirty="0" smtClean="0">
+                <a:solidFill>
+                  <a:schemeClr val="tx1"/>
+                </a:solidFill>
+                <a:latin typeface="Menlo Regular"/>
+                <a:ea typeface="Menlo Regular"/>
+                <a:cs typeface="Menlo Regular"/>
+                <a:sym typeface="Courier New"/>
+              </a:rPr>
+              <a:t>d</a:t>
+            </a:r>
+            <a:r>
+              <a:rPr lang="en-US" sz="2400" dirty="0">
+                <a:solidFill>
+                  <a:schemeClr val="tx1"/>
+                </a:solidFill>
+                <a:latin typeface="Menlo Regular"/>
+                <a:ea typeface="Menlo Regular"/>
+                <a:cs typeface="Menlo Regular"/>
+                <a:sym typeface="Courier New"/>
+              </a:rPr>
+              <a:t>"</a:t>
+            </a:r>
+            <a:r>
+              <a:rPr lang="en" sz="2400" dirty="0" smtClean="0">
+                <a:solidFill>
+                  <a:schemeClr val="tx1"/>
+                </a:solidFill>
+                <a:latin typeface="Menlo Regular"/>
+                <a:ea typeface="Menlo Regular"/>
+                <a:cs typeface="Menlo Regular"/>
+                <a:sym typeface="Courier New"/>
+              </a:rPr>
+              <a:t>, </a:t>
+            </a:r>
+            <a:r>
+              <a:rPr lang="en-US" sz="2400" dirty="0" smtClean="0">
+                <a:solidFill>
+                  <a:schemeClr val="tx1"/>
+                </a:solidFill>
+                <a:latin typeface="Menlo Regular"/>
+                <a:ea typeface="Menlo Regular"/>
+                <a:cs typeface="Menlo Regular"/>
+                <a:sym typeface="Courier New"/>
+              </a:rPr>
+              <a:t>"</a:t>
+            </a:r>
+            <a:r>
+              <a:rPr lang="en" sz="2400" dirty="0" smtClean="0">
+                <a:solidFill>
+                  <a:schemeClr val="tx1"/>
+                </a:solidFill>
+                <a:latin typeface="Menlo Regular"/>
+                <a:ea typeface="Menlo Regular"/>
+                <a:cs typeface="Menlo Regular"/>
+                <a:sym typeface="Courier New"/>
+              </a:rPr>
+              <a:t>e</a:t>
+            </a:r>
+            <a:r>
+              <a:rPr lang="en-US" sz="2400" dirty="0">
+                <a:solidFill>
+                  <a:schemeClr val="tx1"/>
+                </a:solidFill>
+                <a:latin typeface="Menlo Regular"/>
+                <a:ea typeface="Menlo Regular"/>
+                <a:cs typeface="Menlo Regular"/>
+                <a:sym typeface="Courier New"/>
+              </a:rPr>
+              <a:t>"</a:t>
+            </a:r>
+            <a:r>
+              <a:rPr lang="en" sz="2400" dirty="0" smtClean="0">
+                <a:solidFill>
+                  <a:schemeClr val="tx1"/>
+                </a:solidFill>
+                <a:latin typeface="Menlo Regular"/>
+                <a:ea typeface="Menlo Regular"/>
+                <a:cs typeface="Menlo Regular"/>
+                <a:sym typeface="Courier New"/>
+              </a:rPr>
+              <a:t>]</a:t>
+            </a:r>
+            <a:endParaRPr lang="en" sz="2400" dirty="0" smtClean="0">
+              <a:solidFill>
+                <a:schemeClr val="tx1"/>
+              </a:solidFill>
+              <a:latin typeface="Menlo Regular"/>
+              <a:ea typeface="Menlo Regular"/>
+              <a:cs typeface="Menlo Regular"/>
+              <a:sym typeface="Courier New"/>
+            </a:endParaRPr>
+          </a:p>
+          <a:p>
+            <a:pPr lvl="0" rtl="0">
+              <a:spcBef>
+                <a:spcPts val="0"/>
+              </a:spcBef>
+              <a:buNone/>
+            </a:pPr>
+            <a:r>
+              <a:rPr lang="en" sz="2400" dirty="0" smtClean="0">
+                <a:solidFill>
+                  <a:schemeClr val="tx1"/>
+                </a:solidFill>
+                <a:latin typeface="Menlo Regular"/>
+                <a:ea typeface="Menlo Regular"/>
+                <a:cs typeface="Menlo Regular"/>
+                <a:sym typeface="Courier New"/>
+              </a:rPr>
               <a:t>&gt;&gt;&gt; list[:-1]</a:t>
             </a:r>
           </a:p>
@@ -18574,8 +19587,209 @@
                 <a:cs typeface="Menlo Regular"/>
                 <a:sym typeface="Courier New"/>
               </a:rPr>
-              <a:t>[‘a’, ‘b’, ‘c’, ‘d’]</a:t>
-            </a:r>
+              <a:t>[</a:t>
+            </a:r>
+            <a:r>
+              <a:rPr lang="en-US" sz="2400" dirty="0" smtClean="0">
+                <a:solidFill>
+                  <a:schemeClr val="tx1"/>
+                </a:solidFill>
+                <a:latin typeface="Menlo Regular"/>
+                <a:ea typeface="Menlo Regular"/>
+                <a:cs typeface="Menlo Regular"/>
+                <a:sym typeface="Courier New"/>
+              </a:rPr>
+              <a:t>'</a:t>
+            </a:r>
+            <a:r>
+              <a:rPr lang="en" sz="2400" dirty="0" smtClean="0">
+                <a:solidFill>
+                  <a:schemeClr val="tx1"/>
+                </a:solidFill>
+                <a:latin typeface="Menlo Regular"/>
+                <a:ea typeface="Menlo Regular"/>
+                <a:cs typeface="Menlo Regular"/>
+                <a:sym typeface="Courier New"/>
+              </a:rPr>
+              <a:t>a</a:t>
+            </a:r>
+            <a:r>
+              <a:rPr lang="en-US" sz="2400" dirty="0" smtClean="0">
+                <a:solidFill>
+                  <a:schemeClr val="tx1"/>
+                </a:solidFill>
+                <a:latin typeface="Menlo Regular"/>
+                <a:ea typeface="Menlo Regular"/>
+                <a:cs typeface="Menlo Regular"/>
+                <a:sym typeface="Courier New"/>
+              </a:rPr>
+              <a:t>'</a:t>
+            </a:r>
+            <a:r>
+              <a:rPr lang="en" sz="2400" dirty="0" smtClean="0">
+                <a:solidFill>
+                  <a:schemeClr val="tx1"/>
+                </a:solidFill>
+                <a:latin typeface="Menlo Regular"/>
+                <a:ea typeface="Menlo Regular"/>
+                <a:cs typeface="Menlo Regular"/>
+                <a:sym typeface="Courier New"/>
+              </a:rPr>
+              <a:t>, </a:t>
+            </a:r>
+            <a:r>
+              <a:rPr lang="en-US" sz="2400" dirty="0" smtClean="0">
+                <a:solidFill>
+                  <a:schemeClr val="tx1"/>
+                </a:solidFill>
+                <a:latin typeface="Menlo Regular"/>
+                <a:ea typeface="Menlo Regular"/>
+                <a:cs typeface="Menlo Regular"/>
+                <a:sym typeface="Courier New"/>
+              </a:rPr>
+              <a:t>'</a:t>
+            </a:r>
+            <a:r>
+              <a:rPr lang="en" sz="2400" dirty="0" smtClean="0">
+                <a:solidFill>
+                  <a:schemeClr val="tx1"/>
+                </a:solidFill>
+                <a:latin typeface="Menlo Regular"/>
+                <a:ea typeface="Menlo Regular"/>
+                <a:cs typeface="Menlo Regular"/>
+                <a:sym typeface="Courier New"/>
+              </a:rPr>
+              <a:t>b</a:t>
+            </a:r>
+            <a:r>
+              <a:rPr lang="en-US" sz="2400" dirty="0" smtClean="0">
+                <a:solidFill>
+                  <a:schemeClr val="tx1"/>
+                </a:solidFill>
+                <a:latin typeface="Menlo Regular"/>
+                <a:ea typeface="Menlo Regular"/>
+                <a:cs typeface="Menlo Regular"/>
+                <a:sym typeface="Courier New"/>
+              </a:rPr>
+              <a:t>'</a:t>
+            </a:r>
+            <a:r>
+              <a:rPr lang="en" sz="2400" dirty="0" smtClean="0">
+                <a:solidFill>
+                  <a:schemeClr val="tx1"/>
+                </a:solidFill>
+                <a:latin typeface="Menlo Regular"/>
+                <a:ea typeface="Menlo Regular"/>
+                <a:cs typeface="Menlo Regular"/>
+                <a:sym typeface="Courier New"/>
+              </a:rPr>
+              <a:t>, </a:t>
+            </a:r>
+            <a:r>
+              <a:rPr lang="en-US" sz="2400" dirty="0" smtClean="0">
+                <a:solidFill>
+                  <a:schemeClr val="tx1"/>
+                </a:solidFill>
+                <a:latin typeface="Menlo Regular"/>
+                <a:ea typeface="Menlo Regular"/>
+                <a:cs typeface="Menlo Regular"/>
+                <a:sym typeface="Courier New"/>
+              </a:rPr>
+              <a:t>'</a:t>
+            </a:r>
+            <a:r>
+              <a:rPr lang="en" sz="2400" dirty="0" smtClean="0">
+                <a:solidFill>
+                  <a:schemeClr val="tx1"/>
+                </a:solidFill>
+                <a:latin typeface="Menlo Regular"/>
+                <a:ea typeface="Menlo Regular"/>
+                <a:cs typeface="Menlo Regular"/>
+                <a:sym typeface="Courier New"/>
+              </a:rPr>
+              <a:t>c</a:t>
+            </a:r>
+            <a:r>
+              <a:rPr lang="en-US" sz="2400" dirty="0" smtClean="0">
+                <a:solidFill>
+                  <a:schemeClr val="tx1"/>
+                </a:solidFill>
+                <a:latin typeface="Menlo Regular"/>
+                <a:ea typeface="Menlo Regular"/>
+                <a:cs typeface="Menlo Regular"/>
+                <a:sym typeface="Courier New"/>
+              </a:rPr>
+              <a:t>'</a:t>
+            </a:r>
+            <a:r>
+              <a:rPr lang="en" sz="2400" dirty="0" smtClean="0">
+                <a:solidFill>
+                  <a:schemeClr val="tx1"/>
+                </a:solidFill>
+                <a:latin typeface="Menlo Regular"/>
+                <a:ea typeface="Menlo Regular"/>
+                <a:cs typeface="Menlo Regular"/>
+                <a:sym typeface="Courier New"/>
+              </a:rPr>
+              <a:t>, </a:t>
+            </a:r>
+            <a:r>
+              <a:rPr lang="en-US" sz="2400" dirty="0" smtClean="0">
+                <a:solidFill>
+                  <a:schemeClr val="tx1"/>
+                </a:solidFill>
+                <a:latin typeface="Menlo Regular"/>
+                <a:ea typeface="Menlo Regular"/>
+                <a:cs typeface="Menlo Regular"/>
+                <a:sym typeface="Courier New"/>
+              </a:rPr>
+              <a:t>'</a:t>
+            </a:r>
+            <a:r>
+              <a:rPr lang="en" sz="2400" dirty="0" smtClean="0">
+                <a:solidFill>
+                  <a:schemeClr val="tx1"/>
+                </a:solidFill>
+                <a:latin typeface="Menlo Regular"/>
+                <a:ea typeface="Menlo Regular"/>
+                <a:cs typeface="Menlo Regular"/>
+                <a:sym typeface="Courier New"/>
+              </a:rPr>
+              <a:t>d</a:t>
+            </a:r>
+            <a:r>
+              <a:rPr lang="en-US" sz="2400" dirty="0" smtClean="0">
+                <a:solidFill>
+                  <a:schemeClr val="tx1"/>
+                </a:solidFill>
+                <a:latin typeface="Menlo Regular"/>
+                <a:ea typeface="Menlo Regular"/>
+                <a:cs typeface="Menlo Regular"/>
+                <a:sym typeface="Courier New"/>
+              </a:rPr>
+              <a:t>'</a:t>
+            </a:r>
+            <a:r>
+              <a:rPr lang="en" sz="2400" dirty="0" smtClean="0">
+                <a:solidFill>
+                  <a:schemeClr val="tx1"/>
+                </a:solidFill>
+                <a:latin typeface="Menlo Regular"/>
+                <a:ea typeface="Menlo Regular"/>
+                <a:cs typeface="Menlo Regular"/>
+                <a:sym typeface="Courier New"/>
+              </a:rPr>
+              <a:t>]</a:t>
+            </a:r>
+            <a:endParaRPr lang="en" sz="2400" dirty="0" smtClean="0">
+              <a:solidFill>
+                <a:schemeClr val="tx1"/>
+              </a:solidFill>
+              <a:latin typeface="Menlo Regular"/>
+              <a:ea typeface="Menlo Regular"/>
+              <a:cs typeface="Menlo Regular"/>
+              <a:sym typeface="Courier New"/>
+            </a:endParaRPr>
           </a:p>
           <a:p>
             <a:pPr lvl="0" rtl="0">
@@ -18643,13 +19857,13 @@
   <p:clrMapOvr>
     <a:masterClrMapping/>
   </p:clrMapOvr>
-  <p:transition spd="slow">
+  <p:transition xmlns:p14="http://schemas.microsoft.com/office/powerpoint/2010/main" spd="slow">
     <p:cut/>
   </p:transition>
   <p:timing>
     <p:tnLst>
       <p:par>
-        <p:cTn id="1" dur="indefinite" restart="never" nodeType="tmRoot"/>
+        <p:cTn xmlns:p14="http://schemas.microsoft.com/office/powerpoint/2010/main" id="1" dur="indefinite" restart="never" nodeType="tmRoot"/>
       </p:par>
     </p:tnLst>
   </p:timing>
@@ -18840,13 +20054,13 @@
   <p:clrMapOvr>
     <a:masterClrMapping/>
   </p:clrMapOvr>
-  <p:transition spd="slow">
+  <p:transition xmlns:p14="http://schemas.microsoft.com/office/powerpoint/2010/main" spd="slow">
     <p:cut/>
   </p:transition>
   <p:timing>
     <p:tnLst>
       <p:par>
-        <p:cTn id="1" dur="indefinite" restart="never" nodeType="tmRoot"/>
+        <p:cTn xmlns:p14="http://schemas.microsoft.com/office/powerpoint/2010/main" id="1" dur="indefinite" restart="never" nodeType="tmRoot"/>
       </p:par>
     </p:tnLst>
   </p:timing>
@@ -18972,8 +20186,17 @@
             </a:pPr>
             <a:r>
               <a:rPr lang="en" dirty="0"/>
-              <a:t>Why use a file? What's different from irb?</a:t>
-            </a:r>
+              <a:t>Why use a file? What's different from </a:t>
+            </a:r>
+            <a:r>
+              <a:rPr lang="en-US" dirty="0" smtClean="0"/>
+              <a:t>running in the python interpreter</a:t>
+            </a:r>
+            <a:r>
+              <a:rPr lang="en" dirty="0" smtClean="0"/>
+              <a:t>?</a:t>
+            </a:r>
+            <a:endParaRPr lang="en" dirty="0"/>
           </a:p>
           <a:p>
             <a:pPr marL="457200" lvl="0" indent="-419100" rtl="0">
@@ -19014,7 +20237,7 @@
   <p:clrMapOvr>
     <a:masterClrMapping/>
   </p:clrMapOvr>
-  <p:transition spd="slow">
+  <p:transition xmlns:p14="http://schemas.microsoft.com/office/powerpoint/2010/main" spd="slow">
     <p:cut/>
   </p:transition>
 </p:sld>
@@ -19087,7 +20310,7 @@
   <p:clrMapOvr>
     <a:masterClrMapping/>
   </p:clrMapOvr>
-  <p:transition spd="slow">
+  <p:transition xmlns:p14="http://schemas.microsoft.com/office/powerpoint/2010/main" spd="slow">
     <p:cut/>
   </p:transition>
 </p:sld>
@@ -19460,7 +20683,7 @@
   <p:clrMapOvr>
     <a:masterClrMapping/>
   </p:clrMapOvr>
-  <p:transition spd="slow">
+  <p:transition xmlns:p14="http://schemas.microsoft.com/office/powerpoint/2010/main" spd="slow">
     <p:cut/>
   </p:transition>
 </p:sld>
@@ -19797,8 +21020,161 @@
                 <a:cs typeface="Menlo Regular"/>
                 <a:sym typeface="Courier New"/>
               </a:rPr>
-              <a:t>[‘kiwi’, ‘strawberry’, ‘plum’]</a:t>
-            </a:r>
+              <a:t>[</a:t>
+            </a:r>
+            <a:r>
+              <a:rPr lang="en-US" sz="2400" dirty="0" smtClean="0">
+                <a:solidFill>
+                  <a:srgbClr val="000000"/>
+                </a:solidFill>
+                <a:latin typeface="Menlo Regular"/>
+                <a:ea typeface="Menlo Regular"/>
+                <a:cs typeface="Menlo Regular"/>
+                <a:sym typeface="Courier New"/>
+              </a:rPr>
+              <a:t>'</a:t>
+            </a:r>
+            <a:r>
+              <a:rPr lang="en" sz="2400" dirty="0" smtClean="0">
+                <a:solidFill>
+                  <a:srgbClr val="000000"/>
+                </a:solidFill>
+                <a:latin typeface="Menlo Regular"/>
+                <a:ea typeface="Menlo Regular"/>
+                <a:cs typeface="Menlo Regular"/>
+                <a:sym typeface="Courier New"/>
+              </a:rPr>
+              <a:t>kiwi</a:t>
+            </a:r>
+            <a:r>
+              <a:rPr lang="en-US" sz="2400" dirty="0">
+                <a:solidFill>
+                  <a:srgbClr val="000000"/>
+                </a:solidFill>
+                <a:latin typeface="Menlo Regular"/>
+                <a:ea typeface="Menlo Regular"/>
+                <a:cs typeface="Menlo Regular"/>
+                <a:sym typeface="Courier New"/>
+              </a:rPr>
+              <a:t>'</a:t>
+            </a:r>
+            <a:r>
+              <a:rPr lang="en" sz="2400" dirty="0" smtClean="0">
+                <a:solidFill>
+                  <a:srgbClr val="000000"/>
+                </a:solidFill>
+                <a:latin typeface="Menlo Regular"/>
+                <a:ea typeface="Menlo Regular"/>
+                <a:cs typeface="Menlo Regular"/>
+                <a:sym typeface="Courier New"/>
+              </a:rPr>
+              <a:t>, </a:t>
+            </a:r>
+            <a:r>
+              <a:rPr lang="en-US" sz="2400" dirty="0">
+                <a:solidFill>
+                  <a:srgbClr val="000000"/>
+                </a:solidFill>
+                <a:latin typeface="Menlo Regular"/>
+                <a:ea typeface="Menlo Regular"/>
+                <a:cs typeface="Menlo Regular"/>
+                <a:sym typeface="Courier New"/>
+              </a:rPr>
+              <a:t>'</a:t>
+            </a:r>
+            <a:r>
+              <a:rPr lang="en" sz="2400" dirty="0" smtClean="0">
+                <a:solidFill>
+                  <a:srgbClr val="000000"/>
+                </a:solidFill>
+                <a:latin typeface="Menlo Regular"/>
+                <a:ea typeface="Menlo Regular"/>
+                <a:cs typeface="Menlo Regular"/>
+                <a:sym typeface="Courier New"/>
+              </a:rPr>
+              <a:t>strawberry</a:t>
+            </a:r>
+            <a:r>
+              <a:rPr lang="en-US" sz="2400" dirty="0">
+                <a:solidFill>
+                  <a:srgbClr val="000000"/>
+                </a:solidFill>
+                <a:latin typeface="Menlo Regular"/>
+                <a:ea typeface="Menlo Regular"/>
+                <a:cs typeface="Menlo Regular"/>
+                <a:sym typeface="Courier New"/>
+              </a:rPr>
+              <a:t>'</a:t>
+            </a:r>
+            <a:r>
+              <a:rPr lang="en" sz="2400" dirty="0" smtClean="0">
+                <a:solidFill>
+                  <a:srgbClr val="000000"/>
+                </a:solidFill>
+                <a:latin typeface="Menlo Regular"/>
+                <a:ea typeface="Menlo Regular"/>
+                <a:cs typeface="Menlo Regular"/>
+                <a:sym typeface="Courier New"/>
+              </a:rPr>
+              <a:t>, </a:t>
+            </a:r>
+            <a:r>
+              <a:rPr lang="en-US" sz="2400" dirty="0">
+                <a:solidFill>
+                  <a:srgbClr val="000000"/>
+                </a:solidFill>
+                <a:latin typeface="Menlo Regular"/>
+                <a:ea typeface="Menlo Regular"/>
+                <a:cs typeface="Menlo Regular"/>
+                <a:sym typeface="Courier New"/>
+              </a:rPr>
+              <a:t>'</a:t>
+            </a:r>
+            <a:r>
+              <a:rPr lang="en" sz="2400" dirty="0" smtClean="0">
+                <a:solidFill>
+                  <a:srgbClr val="000000"/>
+                </a:solidFill>
+                <a:latin typeface="Menlo Regular"/>
+                <a:ea typeface="Menlo Regular"/>
+                <a:cs typeface="Menlo Regular"/>
+                <a:sym typeface="Courier New"/>
+              </a:rPr>
+              <a:t>plum</a:t>
+            </a:r>
+            <a:r>
+              <a:rPr lang="en-US" sz="2400" dirty="0">
+                <a:solidFill>
+                  <a:srgbClr val="000000"/>
+                </a:solidFill>
+                <a:latin typeface="Menlo Regular"/>
+                <a:ea typeface="Menlo Regular"/>
+                <a:cs typeface="Menlo Regular"/>
+                <a:sym typeface="Courier New"/>
+              </a:rPr>
+              <a:t>'</a:t>
+            </a:r>
+            <a:r>
+              <a:rPr lang="en" sz="2400" dirty="0" smtClean="0">
+                <a:solidFill>
+                  <a:srgbClr val="000000"/>
+                </a:solidFill>
+                <a:latin typeface="Menlo Regular"/>
+                <a:ea typeface="Menlo Regular"/>
+                <a:cs typeface="Menlo Regular"/>
+                <a:sym typeface="Courier New"/>
+              </a:rPr>
+              <a:t>]</a:t>
+            </a:r>
+            <a:endParaRPr lang="en" sz="2400" dirty="0" smtClean="0">
+              <a:solidFill>
+                <a:srgbClr val="000000"/>
+              </a:solidFill>
+              <a:latin typeface="Menlo Regular"/>
+              <a:ea typeface="Menlo Regular"/>
+              <a:cs typeface="Menlo Regular"/>
+              <a:sym typeface="Courier New"/>
+            </a:endParaRPr>
           </a:p>
           <a:p>
             <a:pPr lvl="0" rtl="0">
@@ -20044,7 +21420,19 @@
                 <a:cs typeface="Menlo Regular"/>
                 <a:sym typeface="Courier New"/>
               </a:rPr>
-              <a:t>MD“</a:t>
+              <a:t>MD</a:t>
+            </a:r>
+            <a:r>
+              <a:rPr lang="en-US" sz="2400" dirty="0" smtClean="0">
+                <a:solidFill>
+                  <a:srgbClr val="FF0000"/>
+                </a:solidFill>
+                <a:latin typeface="Menlo Regular"/>
+                <a:ea typeface="Menlo Regular"/>
+                <a:cs typeface="Menlo Regular"/>
+                <a:sym typeface="Courier New"/>
+              </a:rPr>
+              <a:t>"</a:t>
             </a:r>
             <a:r>
               <a:rPr lang="en" sz="2400" dirty="0" smtClean="0">
@@ -20153,7 +21541,199 @@
                 <a:cs typeface="Menlo Regular"/>
                 <a:sym typeface="Courier New"/>
               </a:rPr>
-              <a:t>{‘VA’: ‘Virginia’, ‘MD’: ‘Maryland’}</a:t>
+              <a:t>{</a:t>
+            </a:r>
+            <a:r>
+              <a:rPr lang="en-US" sz="2400" dirty="0" smtClean="0">
+                <a:solidFill>
+                  <a:srgbClr val="000000"/>
+                </a:solidFill>
+                <a:latin typeface="Menlo Regular"/>
+                <a:ea typeface="Menlo Regular"/>
+                <a:cs typeface="Menlo Regular"/>
+                <a:sym typeface="Courier New"/>
+              </a:rPr>
+              <a:t>'</a:t>
+            </a:r>
+            <a:r>
+              <a:rPr lang="en" sz="2400" dirty="0" smtClean="0">
+                <a:solidFill>
+                  <a:srgbClr val="000000"/>
+                </a:solidFill>
+                <a:latin typeface="Menlo Regular"/>
+                <a:ea typeface="Menlo Regular"/>
+                <a:cs typeface="Menlo Regular"/>
+                <a:sym typeface="Courier New"/>
+              </a:rPr>
+              <a:t>VA</a:t>
+            </a:r>
+            <a:r>
+              <a:rPr lang="en-US" sz="2400" dirty="0" smtClean="0">
+                <a:solidFill>
+                  <a:srgbClr val="000000"/>
+                </a:solidFill>
+                <a:latin typeface="Menlo Regular"/>
+                <a:ea typeface="Menlo Regular"/>
+                <a:cs typeface="Menlo Regular"/>
+                <a:sym typeface="Courier New"/>
+              </a:rPr>
+              <a:t>'</a:t>
+            </a:r>
+            <a:r>
+              <a:rPr lang="en" sz="2400" dirty="0" smtClean="0">
+                <a:solidFill>
+                  <a:srgbClr val="000000"/>
+                </a:solidFill>
+                <a:latin typeface="Menlo Regular"/>
+                <a:ea typeface="Menlo Regular"/>
+                <a:cs typeface="Menlo Regular"/>
+                <a:sym typeface="Courier New"/>
+              </a:rPr>
+              <a:t>: </a:t>
+            </a:r>
+            <a:r>
+              <a:rPr lang="en-US" sz="2400" dirty="0" smtClean="0">
+                <a:solidFill>
+                  <a:srgbClr val="000000"/>
+                </a:solidFill>
+                <a:latin typeface="Menlo Regular"/>
+                <a:ea typeface="Menlo Regular"/>
+                <a:cs typeface="Menlo Regular"/>
+                <a:sym typeface="Courier New"/>
+              </a:rPr>
+              <a:t>'</a:t>
+            </a:r>
+            <a:r>
+              <a:rPr lang="en" sz="2400" dirty="0" smtClean="0">
+                <a:solidFill>
+                  <a:srgbClr val="000000"/>
+                </a:solidFill>
+                <a:latin typeface="Menlo Regular"/>
+                <a:ea typeface="Menlo Regular"/>
+                <a:cs typeface="Menlo Regular"/>
+                <a:sym typeface="Courier New"/>
+              </a:rPr>
+              <a:t>Virginia</a:t>
+            </a:r>
+            <a:r>
+              <a:rPr lang="en-US" sz="2400" dirty="0" smtClean="0">
+                <a:solidFill>
+                  <a:srgbClr val="000000"/>
+                </a:solidFill>
+                <a:latin typeface="Menlo Regular"/>
+                <a:ea typeface="Menlo Regular"/>
+                <a:cs typeface="Menlo Regular"/>
+                <a:sym typeface="Courier New"/>
+              </a:rPr>
+              <a:t>'</a:t>
+            </a:r>
+            <a:r>
+              <a:rPr lang="en" sz="2400" dirty="0" smtClean="0">
+                <a:solidFill>
+                  <a:srgbClr val="000000"/>
+                </a:solidFill>
+                <a:latin typeface="Menlo Regular"/>
+                <a:ea typeface="Menlo Regular"/>
+                <a:cs typeface="Menlo Regular"/>
+                <a:sym typeface="Courier New"/>
+              </a:rPr>
+              <a:t>, </a:t>
+            </a:r>
+            <a:r>
+              <a:rPr lang="en-US" sz="2400" dirty="0" smtClean="0">
+                <a:solidFill>
+                  <a:srgbClr val="000000"/>
+                </a:solidFill>
+                <a:latin typeface="Menlo Regular"/>
+                <a:ea typeface="Menlo Regular"/>
+                <a:cs typeface="Menlo Regular"/>
+                <a:sym typeface="Courier New"/>
+              </a:rPr>
+              <a:t>'</a:t>
+            </a:r>
+            <a:r>
+              <a:rPr lang="en" sz="2400" dirty="0" smtClean="0">
+                <a:solidFill>
+                  <a:srgbClr val="000000"/>
+                </a:solidFill>
+                <a:latin typeface="Menlo Regular"/>
+                <a:ea typeface="Menlo Regular"/>
+                <a:cs typeface="Menlo Regular"/>
+                <a:sym typeface="Courier New"/>
+              </a:rPr>
+              <a:t>MD</a:t>
+            </a:r>
+            <a:r>
+              <a:rPr lang="en-US" sz="2400" dirty="0" smtClean="0">
+                <a:solidFill>
+                  <a:srgbClr val="000000"/>
+                </a:solidFill>
+                <a:latin typeface="Menlo Regular"/>
+                <a:ea typeface="Menlo Regular"/>
+                <a:cs typeface="Menlo Regular"/>
+                <a:sym typeface="Courier New"/>
+              </a:rPr>
+              <a:t>'</a:t>
+            </a:r>
+            <a:r>
+              <a:rPr lang="en" sz="2400" dirty="0" smtClean="0">
+                <a:solidFill>
+                  <a:srgbClr val="000000"/>
+                </a:solidFill>
+                <a:latin typeface="Menlo Regular"/>
+                <a:ea typeface="Menlo Regular"/>
+                <a:cs typeface="Menlo Regular"/>
+                <a:sym typeface="Courier New"/>
+              </a:rPr>
+              <a:t>: </a:t>
+            </a:r>
+            <a:r>
+              <a:rPr lang="en-US" sz="2400" dirty="0" smtClean="0">
+                <a:solidFill>
+                  <a:srgbClr val="000000"/>
+                </a:solidFill>
+                <a:latin typeface="Menlo Regular"/>
+                <a:ea typeface="Menlo Regular"/>
+                <a:cs typeface="Menlo Regular"/>
+                <a:sym typeface="Courier New"/>
+              </a:rPr>
+              <a:t>'</a:t>
+            </a:r>
+            <a:r>
+              <a:rPr lang="en" sz="2400" dirty="0" smtClean="0">
+                <a:solidFill>
+                  <a:srgbClr val="000000"/>
+                </a:solidFill>
+                <a:latin typeface="Menlo Regular"/>
+                <a:ea typeface="Menlo Regular"/>
+                <a:cs typeface="Menlo Regular"/>
+                <a:sym typeface="Courier New"/>
+              </a:rPr>
+              <a:t>Maryland</a:t>
+            </a:r>
+            <a:r>
+              <a:rPr lang="en-US" sz="2400" dirty="0">
+                <a:solidFill>
+                  <a:srgbClr val="000000"/>
+                </a:solidFill>
+                <a:latin typeface="Menlo Regular"/>
+                <a:ea typeface="Menlo Regular"/>
+                <a:cs typeface="Menlo Regular"/>
+                <a:sym typeface="Courier New"/>
+              </a:rPr>
+              <a:t>'</a:t>
+            </a:r>
+            <a:r>
+              <a:rPr lang="en" sz="2400" dirty="0" smtClean="0">
+                <a:solidFill>
+                  <a:srgbClr val="000000"/>
+                </a:solidFill>
+                <a:latin typeface="Menlo Regular"/>
+                <a:ea typeface="Menlo Regular"/>
+                <a:cs typeface="Menlo Regular"/>
+                <a:sym typeface="Courier New"/>
+              </a:rPr>
+              <a:t>}</a:t>
             </a:r>
             <a:endParaRPr sz="2400" dirty="0">
               <a:solidFill>
@@ -20201,7 +21781,7 @@
   <p:clrMapOvr>
     <a:masterClrMapping/>
   </p:clrMapOvr>
-  <p:transition spd="slow">
+  <p:transition xmlns:p14="http://schemas.microsoft.com/office/powerpoint/2010/main" spd="slow">
     <p:cut/>
   </p:transition>
 </p:sld>
@@ -20601,7 +22181,7 @@
   <p:clrMapOvr>
     <a:masterClrMapping/>
   </p:clrMapOvr>
-  <p:transition spd="slow">
+  <p:transition xmlns:p14="http://schemas.microsoft.com/office/powerpoint/2010/main" spd="slow">
     <p:cut/>
   </p:transition>
 </p:sld>
@@ -21063,7 +22643,7 @@
   <p:clrMapOvr>
     <a:masterClrMapping/>
   </p:clrMapOvr>
-  <p:transition spd="slow">
+  <p:transition xmlns:p14="http://schemas.microsoft.com/office/powerpoint/2010/main" spd="slow">
     <p:cut/>
   </p:transition>
 </p:sld>
@@ -21343,7 +22923,7 @@
   <p:clrMapOvr>
     <a:masterClrMapping/>
   </p:clrMapOvr>
-  <p:transition spd="slow">
+  <p:transition xmlns:p14="http://schemas.microsoft.com/office/powerpoint/2010/main" spd="slow">
     <p:cut/>
   </p:transition>
 </p:sld>
@@ -21647,7 +23227,7 @@
   <p:clrMapOvr>
     <a:masterClrMapping/>
   </p:clrMapOvr>
-  <p:transition spd="slow">
+  <p:transition xmlns:p14="http://schemas.microsoft.com/office/powerpoint/2010/main" spd="slow">
     <p:cut/>
   </p:transition>
 </p:sld>
@@ -21702,7 +23282,7 @@
               <a:buNone/>
             </a:pPr>
             <a:r>
-              <a:rPr lang="en" sz="9600" dirty="0" smtClean="0">
+              <a:rPr lang="en" sz="5000" dirty="0" smtClean="0">
                 <a:solidFill>
                   <a:srgbClr val="FF0000"/>
                 </a:solidFill>
@@ -21713,7 +23293,7 @@
               <a:t>Organization</a:t>
             </a:r>
             <a:r>
-              <a:rPr lang="en-US" sz="9600" dirty="0" smtClean="0">
+              <a:rPr lang="en-US" sz="5000" dirty="0" smtClean="0">
                 <a:solidFill>
                   <a:srgbClr val="FF0000"/>
                 </a:solidFill>
@@ -21724,7 +23304,7 @@
               <a:t>: </a:t>
             </a:r>
             <a:r>
-              <a:rPr lang="en" sz="3000" dirty="0" smtClean="0">
+              <a:rPr lang="en" sz="5000" dirty="0" smtClean="0">
                 <a:solidFill>
                   <a:schemeClr val="bg2"/>
                 </a:solidFill>
@@ -21736,7 +23316,7 @@
               <a:t>code </a:t>
             </a:r>
             <a:r>
-              <a:rPr lang="en" sz="3000" dirty="0">
+              <a:rPr lang="en" sz="5000" dirty="0">
                 <a:solidFill>
                   <a:schemeClr val="bg2"/>
                 </a:solidFill>
@@ -22068,7 +23648,7 @@
   <p:clrMapOvr>
     <a:masterClrMapping/>
   </p:clrMapOvr>
-  <p:transition spd="slow">
+  <p:transition xmlns:p14="http://schemas.microsoft.com/office/powerpoint/2010/main" spd="slow">
     <p:cut/>
   </p:transition>
 </p:sld>
@@ -22367,7 +23947,7 @@
   <p:clrMapOvr>
     <a:masterClrMapping/>
   </p:clrMapOvr>
-  <p:transition spd="slow">
+  <p:transition xmlns:p14="http://schemas.microsoft.com/office/powerpoint/2010/main" spd="slow">
     <p:cut/>
   </p:transition>
 </p:sld>
@@ -22544,7 +24124,7 @@
                 <a:cs typeface="Menlo Regular"/>
                 <a:sym typeface="Courier New"/>
               </a:rPr>
-              <a:t>Dickens”</a:t>
+              <a:t>Dickens"</a:t>
             </a:r>
             <a:r>
               <a:rPr lang="en-US" sz="1800" dirty="0" smtClean="0">
@@ -22642,7 +24222,7 @@
                 <a:cs typeface="Menlo Regular"/>
                 <a:sym typeface="Courier New"/>
               </a:rPr>
-              <a:t>Thackeray”</a:t>
+              <a:t>Thackeray"</a:t>
             </a:r>
             <a:r>
               <a:rPr lang="en-US" sz="1800" dirty="0" smtClean="0">
@@ -22731,10 +24311,10 @@
                 <a:cs typeface="Menlo Regular"/>
                 <a:sym typeface="Courier New"/>
               </a:rPr>
-              <a:t>Trollope”</a:t>
-            </a:r>
-            <a:r>
-              <a:rPr lang="en-US" sz="1800" dirty="0">
+              <a:t>Trollope"</a:t>
+            </a:r>
+            <a:r>
+              <a:rPr lang="en-US" sz="1800" dirty="0" smtClean="0">
                 <a:solidFill>
                   <a:srgbClr val="000000"/>
                 </a:solidFill>
@@ -22743,19 +24323,7 @@
                 <a:cs typeface="Menlo Regular"/>
                 <a:sym typeface="Courier New"/>
               </a:rPr>
-              <a:t>:</a:t>
-            </a:r>
-            <a:r>
-              <a:rPr lang="en-US" sz="1800" dirty="0" smtClean="0">
-                <a:solidFill>
-                  <a:srgbClr val="000000"/>
-                </a:solidFill>
-                <a:latin typeface="Menlo Regular"/>
-                <a:ea typeface="Menlo Regular"/>
-                <a:cs typeface="Menlo Regular"/>
-                <a:sym typeface="Courier New"/>
-              </a:rPr>
-              <a:t> </a:t>
+              <a:t>: </a:t>
             </a:r>
             <a:r>
               <a:rPr lang="en-US" sz="1800" dirty="0">
@@ -22841,7 +24409,7 @@
                 <a:cs typeface="Menlo Regular"/>
                 <a:sym typeface="Courier New"/>
               </a:rPr>
-              <a:t>Hopkins”</a:t>
+              <a:t>Hopkins"</a:t>
             </a:r>
             <a:r>
               <a:rPr lang="en-US" sz="1800" dirty="0" smtClean="0">
@@ -22877,8 +24445,17 @@
                 <a:cs typeface="Menlo Regular"/>
                 <a:sym typeface="Courier New"/>
               </a:rPr>
-              <a:t>1889“</a:t>
-            </a:r>
+              <a:t>1889"</a:t>
+            </a:r>
+            <a:endParaRPr lang="en-US" sz="1800" dirty="0" smtClean="0">
+              <a:solidFill>
+                <a:srgbClr val="FF0000"/>
+              </a:solidFill>
+              <a:latin typeface="Menlo Regular"/>
+              <a:ea typeface="Menlo Regular"/>
+              <a:cs typeface="Menlo Regular"/>
+              <a:sym typeface="Courier New"/>
+            </a:endParaRPr>
           </a:p>
           <a:p>
             <a:pPr lvl="0">
@@ -22990,11 +24567,35 @@
                 <a:cs typeface="Menlo Regular"/>
                 <a:sym typeface="Courier New"/>
               </a:rPr>
-              <a:t>print(</a:t>
+              <a:t>print</a:t>
             </a:r>
             <a:r>
               <a:rPr lang="en-US" sz="1800" dirty="0" smtClean="0">
                 <a:solidFill>
+                  <a:srgbClr val="000000"/>
+                </a:solidFill>
+                <a:latin typeface="Menlo Regular"/>
+                <a:ea typeface="Menlo Regular"/>
+                <a:cs typeface="Menlo Regular"/>
+                <a:sym typeface="Courier New"/>
+              </a:rPr>
+              <a:t>(author </a:t>
+            </a:r>
+            <a:r>
+              <a:rPr lang="en-US" sz="1800" dirty="0">
+                <a:solidFill>
+                  <a:srgbClr val="000000"/>
+                </a:solidFill>
+                <a:latin typeface="Menlo Regular"/>
+                <a:ea typeface="Menlo Regular"/>
+                <a:cs typeface="Menlo Regular"/>
+                <a:sym typeface="Courier New"/>
+              </a:rPr>
+              <a:t>+ </a:t>
+            </a:r>
+            <a:r>
+              <a:rPr lang="en-US" sz="1800" dirty="0">
+                <a:solidFill>
                   <a:srgbClr val="FF0000"/>
                 </a:solidFill>
                 <a:latin typeface="Menlo Regular"/>
@@ -23002,10 +24603,10 @@
                 <a:cs typeface="Menlo Regular"/>
                 <a:sym typeface="Courier New"/>
               </a:rPr>
-              <a:t>"%</a:t>
-            </a:r>
-            <a:r>
-              <a:rPr lang="en-US" sz="1800" dirty="0">
+              <a:t>" </a:t>
+            </a:r>
+            <a:r>
+              <a:rPr lang="en-US" sz="1800" dirty="0" smtClean="0">
                 <a:solidFill>
                   <a:srgbClr val="FF0000"/>
                 </a:solidFill>
@@ -23014,10 +24615,10 @@
                 <a:cs typeface="Menlo Regular"/>
                 <a:sym typeface="Courier New"/>
               </a:rPr>
-              <a:t>s" </a:t>
-            </a:r>
-            <a:r>
-              <a:rPr lang="en-US" sz="1800" dirty="0">
+              <a:t>kicked the bucket in "</a:t>
+            </a:r>
+            <a:r>
+              <a:rPr lang="en-US" sz="1800" dirty="0" smtClean="0">
                 <a:solidFill>
                   <a:srgbClr val="000000"/>
                 </a:solidFill>
@@ -23026,35 +24627,11 @@
                 <a:cs typeface="Menlo Regular"/>
                 <a:sym typeface="Courier New"/>
               </a:rPr>
-              <a:t>% author + </a:t>
-            </a:r>
-            <a:r>
-              <a:rPr lang="en-US" sz="1800" dirty="0">
-                <a:solidFill>
-                  <a:srgbClr val="FF0000"/>
-                </a:solidFill>
-                <a:latin typeface="Menlo Regular"/>
-                <a:ea typeface="Menlo Regular"/>
-                <a:cs typeface="Menlo Regular"/>
-                <a:sym typeface="Courier New"/>
-              </a:rPr>
-              <a:t>" </a:t>
+              <a:t> </a:t>
             </a:r>
             <a:r>
               <a:rPr lang="en-US" sz="1800" dirty="0" smtClean="0">
                 <a:solidFill>
-                  <a:srgbClr val="FF0000"/>
-                </a:solidFill>
-                <a:latin typeface="Menlo Regular"/>
-                <a:ea typeface="Menlo Regular"/>
-                <a:cs typeface="Menlo Regular"/>
-                <a:sym typeface="Courier New"/>
-              </a:rPr>
-              <a:t>kicked the bucket in "</a:t>
-            </a:r>
-            <a:r>
-              <a:rPr lang="en-US" sz="1800" dirty="0" smtClean="0">
-                <a:solidFill>
                   <a:srgbClr val="000000"/>
                 </a:solidFill>
                 <a:latin typeface="Menlo Regular"/>
@@ -23062,43 +24639,7 @@
                 <a:cs typeface="Menlo Regular"/>
                 <a:sym typeface="Courier New"/>
               </a:rPr>
-              <a:t> </a:t>
-            </a:r>
-            <a:r>
-              <a:rPr lang="en-US" sz="1800" dirty="0">
-                <a:solidFill>
-                  <a:srgbClr val="000000"/>
-                </a:solidFill>
-                <a:latin typeface="Menlo Regular"/>
-                <a:ea typeface="Menlo Regular"/>
-                <a:cs typeface="Menlo Regular"/>
-                <a:sym typeface="Courier New"/>
-              </a:rPr>
               <a:t>+ </a:t>
-            </a:r>
-            <a:r>
-              <a:rPr lang="en-US" sz="1800" dirty="0">
-                <a:solidFill>
-                  <a:srgbClr val="FF0000"/>
-                </a:solidFill>
-                <a:latin typeface="Menlo Regular"/>
-                <a:ea typeface="Menlo Regular"/>
-                <a:cs typeface="Menlo Regular"/>
-                <a:sym typeface="Courier New"/>
-              </a:rPr>
-              <a:t>"%s." </a:t>
-            </a:r>
-            <a:r>
-              <a:rPr lang="en-US" sz="1800" dirty="0">
-                <a:solidFill>
-                  <a:srgbClr val="000000"/>
-                </a:solidFill>
-                <a:latin typeface="Menlo Regular"/>
-                <a:ea typeface="Menlo Regular"/>
-                <a:cs typeface="Menlo Regular"/>
-                <a:sym typeface="Courier New"/>
-              </a:rPr>
-              <a:t>% </a:t>
             </a:r>
             <a:r>
               <a:rPr lang="en-US" sz="1800" dirty="0" smtClean="0">
@@ -23129,7 +24670,7 @@
   <p:clrMapOvr>
     <a:masterClrMapping/>
   </p:clrMapOvr>
-  <p:transition spd="slow">
+  <p:transition xmlns:p14="http://schemas.microsoft.com/office/powerpoint/2010/main" spd="slow">
     <p:cut/>
   </p:transition>
 </p:sld>
@@ -23342,7 +24883,7 @@
   <p:clrMapOvr>
     <a:masterClrMapping/>
   </p:clrMapOvr>
-  <p:transition spd="slow">
+  <p:transition xmlns:p14="http://schemas.microsoft.com/office/powerpoint/2010/main" spd="slow">
     <p:cut/>
   </p:transition>
 </p:sld>
@@ -23607,7 +25148,31 @@
                 <a:cs typeface="Menlo Regular"/>
                 <a:sym typeface="Courier New"/>
               </a:rPr>
-              <a:t>!“)</a:t>
+              <a:t>!</a:t>
+            </a:r>
+            <a:r>
+              <a:rPr lang="en-US" sz="2000" dirty="0" smtClean="0">
+                <a:solidFill>
+                  <a:srgbClr val="FF0000"/>
+                </a:solidFill>
+                <a:latin typeface="Menlo Regular"/>
+                <a:ea typeface="Menlo Regular"/>
+                <a:cs typeface="Menlo Regular"/>
+                <a:sym typeface="Courier New"/>
+              </a:rPr>
+              <a:t>"</a:t>
+            </a:r>
+            <a:r>
+              <a:rPr lang="en" sz="2000" dirty="0" smtClean="0">
+                <a:solidFill>
+                  <a:srgbClr val="FF0000"/>
+                </a:solidFill>
+                <a:latin typeface="Menlo Regular"/>
+                <a:ea typeface="Menlo Regular"/>
+                <a:cs typeface="Menlo Regular"/>
+                <a:sym typeface="Courier New"/>
+              </a:rPr>
+              <a:t>)</a:t>
             </a:r>
             <a:endParaRPr lang="en" sz="2000" dirty="0">
               <a:solidFill>
@@ -23797,7 +25362,31 @@
                 <a:cs typeface="Menlo Regular"/>
                 <a:sym typeface="Courier New"/>
               </a:rPr>
-              <a:t>.“)</a:t>
+              <a:t>.</a:t>
+            </a:r>
+            <a:r>
+              <a:rPr lang="en-US" sz="2000" dirty="0" smtClean="0">
+                <a:solidFill>
+                  <a:srgbClr val="FF0000"/>
+                </a:solidFill>
+                <a:latin typeface="Menlo Regular"/>
+                <a:ea typeface="Menlo Regular"/>
+                <a:cs typeface="Menlo Regular"/>
+                <a:sym typeface="Courier New"/>
+              </a:rPr>
+              <a:t>"</a:t>
+            </a:r>
+            <a:r>
+              <a:rPr lang="en" sz="2000" dirty="0" smtClean="0">
+                <a:solidFill>
+                  <a:srgbClr val="FF0000"/>
+                </a:solidFill>
+                <a:latin typeface="Menlo Regular"/>
+                <a:ea typeface="Menlo Regular"/>
+                <a:cs typeface="Menlo Regular"/>
+                <a:sym typeface="Courier New"/>
+              </a:rPr>
+              <a:t>)</a:t>
             </a:r>
             <a:endParaRPr lang="en" sz="2000" dirty="0">
               <a:solidFill>
@@ -23927,7 +25516,31 @@
                 <a:cs typeface="Menlo Regular"/>
                 <a:sym typeface="Courier New"/>
               </a:rPr>
-              <a:t>.“)</a:t>
+              <a:t>.</a:t>
+            </a:r>
+            <a:r>
+              <a:rPr lang="en-US" sz="2000" dirty="0" smtClean="0">
+                <a:solidFill>
+                  <a:srgbClr val="FF0000"/>
+                </a:solidFill>
+                <a:latin typeface="Menlo Regular"/>
+                <a:ea typeface="Menlo Regular"/>
+                <a:cs typeface="Menlo Regular"/>
+                <a:sym typeface="Courier New"/>
+              </a:rPr>
+              <a:t>"</a:t>
+            </a:r>
+            <a:r>
+              <a:rPr lang="en" sz="2000" dirty="0" smtClean="0">
+                <a:solidFill>
+                  <a:srgbClr val="FF0000"/>
+                </a:solidFill>
+                <a:latin typeface="Menlo Regular"/>
+                <a:ea typeface="Menlo Regular"/>
+                <a:cs typeface="Menlo Regular"/>
+                <a:sym typeface="Courier New"/>
+              </a:rPr>
+              <a:t>)</a:t>
             </a:r>
             <a:endParaRPr lang="en" sz="2000" dirty="0">
               <a:solidFill>
@@ -23997,7 +25610,7 @@
   <p:clrMapOvr>
     <a:masterClrMapping/>
   </p:clrMapOvr>
-  <p:transition spd="slow">
+  <p:transition xmlns:p14="http://schemas.microsoft.com/office/powerpoint/2010/main" spd="slow">
     <p:cut/>
   </p:transition>
 </p:sld>
@@ -24052,7 +25665,7 @@
               <a:buNone/>
             </a:pPr>
             <a:r>
-              <a:rPr lang="en-US" sz="9600" dirty="0" smtClean="0">
+              <a:rPr lang="en-US" sz="5000" dirty="0" smtClean="0">
                 <a:solidFill>
                   <a:srgbClr val="FF0000"/>
                 </a:solidFill>
@@ -24062,11 +25675,11 @@
               <a:t>An Answer:</a:t>
             </a:r>
             <a:r>
-              <a:rPr lang="en" dirty="0" smtClean="0"/>
+              <a:rPr lang="en" sz="5000" dirty="0" smtClean="0"/>
               <a:t> </a:t>
             </a:r>
             <a:r>
-              <a:rPr lang="en" dirty="0" smtClean="0">
+              <a:rPr lang="en" sz="5000" dirty="0" smtClean="0">
                 <a:solidFill>
                   <a:schemeClr val="bg2"/>
                 </a:solidFill>
@@ -24075,7 +25688,7 @@
               </a:rPr>
               <a:t>improved</a:t>
             </a:r>
-            <a:endParaRPr lang="en" dirty="0">
+            <a:endParaRPr lang="en" sz="5000" dirty="0">
               <a:solidFill>
                 <a:schemeClr val="bg2"/>
               </a:solidFill>
@@ -24280,7 +25893,31 @@
                 <a:cs typeface="Menlo Regular"/>
                 <a:sym typeface="Courier New"/>
               </a:rPr>
-              <a:t>!“)</a:t>
+              <a:t>!</a:t>
+            </a:r>
+            <a:r>
+              <a:rPr lang="en-US" sz="2100" dirty="0" smtClean="0">
+                <a:solidFill>
+                  <a:srgbClr val="FF0000"/>
+                </a:solidFill>
+                <a:latin typeface="Menlo Regular"/>
+                <a:ea typeface="Menlo Regular"/>
+                <a:cs typeface="Menlo Regular"/>
+                <a:sym typeface="Courier New"/>
+              </a:rPr>
+              <a:t>"</a:t>
+            </a:r>
+            <a:r>
+              <a:rPr lang="en" sz="2100" dirty="0" smtClean="0">
+                <a:solidFill>
+                  <a:srgbClr val="FF0000"/>
+                </a:solidFill>
+                <a:latin typeface="Menlo Regular"/>
+                <a:ea typeface="Menlo Regular"/>
+                <a:cs typeface="Menlo Regular"/>
+                <a:sym typeface="Courier New"/>
+              </a:rPr>
+              <a:t>)</a:t>
             </a:r>
             <a:endParaRPr lang="en" sz="2100" dirty="0">
               <a:solidFill>
@@ -24470,7 +26107,31 @@
                 <a:cs typeface="Menlo Regular"/>
                 <a:sym typeface="Courier New"/>
               </a:rPr>
-              <a:t>.“)</a:t>
+              <a:t>.</a:t>
+            </a:r>
+            <a:r>
+              <a:rPr lang="en-US" sz="2100" dirty="0">
+                <a:solidFill>
+                  <a:srgbClr val="FF0000"/>
+                </a:solidFill>
+                <a:latin typeface="Menlo Regular"/>
+                <a:ea typeface="Menlo Regular"/>
+                <a:cs typeface="Menlo Regular"/>
+                <a:sym typeface="Courier New"/>
+              </a:rPr>
+              <a:t>"</a:t>
+            </a:r>
+            <a:r>
+              <a:rPr lang="en" sz="2100" dirty="0" smtClean="0">
+                <a:solidFill>
+                  <a:srgbClr val="FF0000"/>
+                </a:solidFill>
+                <a:latin typeface="Menlo Regular"/>
+                <a:ea typeface="Menlo Regular"/>
+                <a:cs typeface="Menlo Regular"/>
+                <a:sym typeface="Courier New"/>
+              </a:rPr>
+              <a:t>)</a:t>
             </a:r>
             <a:endParaRPr lang="en" sz="2100" dirty="0">
               <a:solidFill>
@@ -24588,7 +26249,31 @@
                 <a:cs typeface="Menlo Regular"/>
                 <a:sym typeface="Courier New"/>
               </a:rPr>
-              <a:t>.“)</a:t>
+              <a:t>.</a:t>
+            </a:r>
+            <a:r>
+              <a:rPr lang="en-US" sz="2100" dirty="0" smtClean="0">
+                <a:solidFill>
+                  <a:srgbClr val="FF0000"/>
+                </a:solidFill>
+                <a:latin typeface="Menlo Regular"/>
+                <a:ea typeface="Menlo Regular"/>
+                <a:cs typeface="Menlo Regular"/>
+                <a:sym typeface="Courier New"/>
+              </a:rPr>
+              <a:t>"</a:t>
+            </a:r>
+            <a:r>
+              <a:rPr lang="en" sz="2100" dirty="0" smtClean="0">
+                <a:solidFill>
+                  <a:srgbClr val="FF0000"/>
+                </a:solidFill>
+                <a:latin typeface="Menlo Regular"/>
+                <a:ea typeface="Menlo Regular"/>
+                <a:cs typeface="Menlo Regular"/>
+                <a:sym typeface="Courier New"/>
+              </a:rPr>
+              <a:t>)</a:t>
             </a:r>
             <a:endParaRPr lang="en" sz="2100" dirty="0">
               <a:solidFill>
@@ -24655,12 +26340,8 @@
               <a:t>g</a:t>
             </a:r>
             <a:r>
-              <a:rPr lang="en" sz="2200" smtClean="0"/>
-              <a:t>reeting(2013</a:t>
-            </a:r>
-            <a:r>
               <a:rPr lang="en" sz="2200" dirty="0" smtClean="0"/>
-              <a:t>)</a:t>
+              <a:t>reeting(2013)</a:t>
             </a:r>
             <a:endParaRPr lang="en" sz="2200" dirty="0"/>
           </a:p>
@@ -24688,7 +26369,7 @@
   <p:clrMapOvr>
     <a:masterClrMapping/>
   </p:clrMapOvr>
-  <p:transition spd="slow">
+  <p:transition xmlns:p14="http://schemas.microsoft.com/office/powerpoint/2010/main" spd="slow">
     <p:cut/>
   </p:transition>
 </p:sld>
@@ -24877,6 +26558,18 @@
               <a:buNone/>
             </a:pPr>
             <a:r>
+              <a:rPr lang="en-US" sz="2000" dirty="0">
+                <a:solidFill>
+                  <a:srgbClr val="000000"/>
+                </a:solidFill>
+                <a:latin typeface="Menlo Regular"/>
+                <a:ea typeface="Menlo Regular"/>
+                <a:cs typeface="Menlo Regular"/>
+                <a:sym typeface="Courier New"/>
+              </a:rPr>
+              <a:t>'</a:t>
+            </a:r>
+            <a:r>
               <a:rPr lang="en-US" sz="2000" dirty="0" smtClean="0">
                 <a:solidFill>
                   <a:srgbClr val="000000"/>
@@ -24886,7 +26579,7 @@
                 <a:cs typeface="Menlo Regular"/>
                 <a:sym typeface="Courier New"/>
               </a:rPr>
-              <a:t>‘k</a:t>
+              <a:t>k</a:t>
             </a:r>
             <a:r>
               <a:rPr lang="en" sz="2000" dirty="0" smtClean="0">
@@ -24898,7 +26591,19 @@
                 <a:cs typeface="Menlo Regular"/>
                 <a:sym typeface="Courier New"/>
               </a:rPr>
-              <a:t>iwi’</a:t>
+              <a:t>iwi</a:t>
+            </a:r>
+            <a:r>
+              <a:rPr lang="en-US" sz="2000" dirty="0">
+                <a:solidFill>
+                  <a:srgbClr val="000000"/>
+                </a:solidFill>
+                <a:latin typeface="Menlo Regular"/>
+                <a:ea typeface="Menlo Regular"/>
+                <a:cs typeface="Menlo Regular"/>
+                <a:sym typeface="Courier New"/>
+              </a:rPr>
+              <a:t>'</a:t>
             </a:r>
             <a:endParaRPr lang="en" sz="2000" dirty="0">
               <a:solidFill>
@@ -24979,6 +26684,18 @@
               <a:buNone/>
             </a:pPr>
             <a:r>
+              <a:rPr lang="en-US" sz="2000" dirty="0">
+                <a:solidFill>
+                  <a:srgbClr val="000000"/>
+                </a:solidFill>
+                <a:latin typeface="Menlo Regular"/>
+                <a:ea typeface="Menlo Regular"/>
+                <a:cs typeface="Menlo Regular"/>
+                <a:sym typeface="Courier New"/>
+              </a:rPr>
+              <a:t>'</a:t>
+            </a:r>
+            <a:r>
               <a:rPr lang="en" sz="2000" dirty="0" smtClean="0">
                 <a:solidFill>
                   <a:srgbClr val="000000"/>
@@ -24988,7 +26705,19 @@
                 <a:cs typeface="Menlo Regular"/>
                 <a:sym typeface="Courier New"/>
               </a:rPr>
-              <a:t>‘strawberry’</a:t>
+              <a:t>strawberry</a:t>
+            </a:r>
+            <a:r>
+              <a:rPr lang="en-US" sz="2000" dirty="0">
+                <a:solidFill>
+                  <a:srgbClr val="000000"/>
+                </a:solidFill>
+                <a:latin typeface="Menlo Regular"/>
+                <a:ea typeface="Menlo Regular"/>
+                <a:cs typeface="Menlo Regular"/>
+                <a:sym typeface="Courier New"/>
+              </a:rPr>
+              <a:t>'</a:t>
             </a:r>
             <a:endParaRPr lang="en" sz="2000" dirty="0">
               <a:solidFill>
@@ -25069,6 +26798,18 @@
               <a:buNone/>
             </a:pPr>
             <a:r>
+              <a:rPr lang="en-US" sz="2000" dirty="0">
+                <a:solidFill>
+                  <a:srgbClr val="000000"/>
+                </a:solidFill>
+                <a:latin typeface="Menlo Regular"/>
+                <a:ea typeface="Menlo Regular"/>
+                <a:cs typeface="Menlo Regular"/>
+                <a:sym typeface="Courier New"/>
+              </a:rPr>
+              <a:t>'</a:t>
+            </a:r>
+            <a:r>
               <a:rPr lang="en" sz="2000" dirty="0" smtClean="0">
                 <a:solidFill>
                   <a:srgbClr val="000000"/>
@@ -25078,7 +26819,19 @@
                 <a:cs typeface="Menlo Regular"/>
                 <a:sym typeface="Courier New"/>
               </a:rPr>
-              <a:t>‘plum’</a:t>
+              <a:t>plum</a:t>
+            </a:r>
+            <a:r>
+              <a:rPr lang="en-US" sz="2000" dirty="0" smtClean="0">
+                <a:solidFill>
+                  <a:srgbClr val="000000"/>
+                </a:solidFill>
+                <a:latin typeface="Menlo Regular"/>
+                <a:ea typeface="Menlo Regular"/>
+                <a:cs typeface="Menlo Regular"/>
+                <a:sym typeface="Courier New"/>
+              </a:rPr>
+              <a:t>'</a:t>
             </a:r>
             <a:endParaRPr lang="en" sz="2000" dirty="0">
               <a:solidFill>
@@ -25178,7 +26931,7 @@
   <p:clrMapOvr>
     <a:masterClrMapping/>
   </p:clrMapOvr>
-  <p:transition spd="slow">
+  <p:transition xmlns:p14="http://schemas.microsoft.com/office/powerpoint/2010/main" spd="slow">
     <p:cut/>
   </p:transition>
 </p:sld>
@@ -25349,7 +27102,31 @@
                 <a:cs typeface="Menlo Regular"/>
                 <a:sym typeface="Courier New"/>
               </a:rPr>
-              <a:t>Stevens“:</a:t>
+              <a:t>Stevens</a:t>
+            </a:r>
+            <a:r>
+              <a:rPr lang="en-US" sz="2000" dirty="0" smtClean="0">
+                <a:solidFill>
+                  <a:srgbClr val="FF0000"/>
+                </a:solidFill>
+                <a:latin typeface="Menlo Regular"/>
+                <a:ea typeface="Menlo Regular"/>
+                <a:cs typeface="Menlo Regular"/>
+                <a:sym typeface="Courier New"/>
+              </a:rPr>
+              <a:t>"</a:t>
+            </a:r>
+            <a:r>
+              <a:rPr lang="en" sz="2000" dirty="0" smtClean="0">
+                <a:solidFill>
+                  <a:srgbClr val="FF0000"/>
+                </a:solidFill>
+                <a:latin typeface="Menlo Regular"/>
+                <a:ea typeface="Menlo Regular"/>
+                <a:cs typeface="Menlo Regular"/>
+                <a:sym typeface="Courier New"/>
+              </a:rPr>
+              <a:t>:</a:t>
             </a:r>
             <a:r>
               <a:rPr lang="en" sz="2000" dirty="0" smtClean="0">
@@ -25498,7 +27275,7 @@
   <p:clrMapOvr>
     <a:masterClrMapping/>
   </p:clrMapOvr>
-  <p:transition spd="slow">
+  <p:transition xmlns:p14="http://schemas.microsoft.com/office/powerpoint/2010/main" spd="slow">
     <p:cut/>
   </p:transition>
 </p:sld>
@@ -25640,11 +27417,35 @@
                 <a:cs typeface="Menlo Regular"/>
                 <a:sym typeface="Courier New"/>
               </a:rPr>
-              <a:t>Stevens‘:</a:t>
+              <a:t>Stevens</a:t>
+            </a:r>
+            <a:r>
+              <a:rPr lang="en-US" sz="2100" dirty="0" smtClean="0">
+                <a:solidFill>
+                  <a:srgbClr val="FF0000"/>
+                </a:solidFill>
+                <a:latin typeface="Menlo Regular"/>
+                <a:ea typeface="Menlo Regular"/>
+                <a:cs typeface="Menlo Regular"/>
+                <a:sym typeface="Courier New"/>
+              </a:rPr>
+              <a:t>'</a:t>
             </a:r>
             <a:r>
               <a:rPr lang="en" sz="2100" dirty="0" smtClean="0">
                 <a:solidFill>
+                  <a:srgbClr val="FF0000"/>
+                </a:solidFill>
+                <a:latin typeface="Menlo Regular"/>
+                <a:ea typeface="Menlo Regular"/>
+                <a:cs typeface="Menlo Regular"/>
+                <a:sym typeface="Courier New"/>
+              </a:rPr>
+              <a:t>:</a:t>
+            </a:r>
+            <a:r>
+              <a:rPr lang="en" sz="2100" dirty="0" smtClean="0">
+                <a:solidFill>
                   <a:schemeClr val="tx1"/>
                 </a:solidFill>
                 <a:latin typeface="Menlo Regular"/>
@@ -25679,6 +27480,30 @@
               <a:t>, </a:t>
             </a:r>
             <a:r>
+              <a:rPr lang="en-US" sz="2100" dirty="0">
+                <a:solidFill>
+                  <a:srgbClr val="FF0000"/>
+                </a:solidFill>
+                <a:latin typeface="Menlo Regular"/>
+                <a:ea typeface="Menlo Regular"/>
+                <a:cs typeface="Menlo Regular"/>
+                <a:sym typeface="Courier New"/>
+              </a:rPr>
+              <a:t>'</a:t>
+            </a:r>
+            <a:r>
+              <a:rPr lang="en-US" sz="2100" dirty="0" smtClean="0">
+                <a:solidFill>
+                  <a:srgbClr val="FF0000"/>
+                </a:solidFill>
+                <a:latin typeface="Menlo Regular"/>
+                <a:ea typeface="Menlo Regular"/>
+                <a:cs typeface="Menlo Regular"/>
+                <a:sym typeface="Courier New"/>
+              </a:rPr>
+              <a:t>Brandon</a:t>
+            </a:r>
+            <a:r>
               <a:rPr lang="en" sz="2100" dirty="0" smtClean="0">
                 <a:solidFill>
                   <a:srgbClr val="FF0000"/>
@@ -25688,7 +27513,7 @@
                 <a:cs typeface="Menlo Regular"/>
                 <a:sym typeface="Courier New"/>
               </a:rPr>
-              <a:t>’</a:t>
+              <a:t> </a:t>
             </a:r>
             <a:r>
               <a:rPr lang="en-US" sz="2100" dirty="0" smtClean="0">
@@ -25700,10 +27525,10 @@
                 <a:cs typeface="Menlo Regular"/>
                 <a:sym typeface="Courier New"/>
               </a:rPr>
-              <a:t>Brandon</a:t>
-            </a:r>
-            <a:r>
-              <a:rPr lang="en" sz="2100" dirty="0" smtClean="0">
+              <a:t>Walsh</a:t>
+            </a:r>
+            <a:r>
+              <a:rPr lang="en-US" sz="2200" dirty="0">
                 <a:solidFill>
                   <a:srgbClr val="FF0000"/>
                 </a:solidFill>
@@ -25712,31 +27537,7 @@
                 <a:cs typeface="Menlo Regular"/>
                 <a:sym typeface="Courier New"/>
               </a:rPr>
-              <a:t> </a:t>
-            </a:r>
-            <a:r>
-              <a:rPr lang="en-US" sz="2100" dirty="0" smtClean="0">
-                <a:solidFill>
-                  <a:srgbClr val="FF0000"/>
-                </a:solidFill>
-                <a:latin typeface="Menlo Regular"/>
-                <a:ea typeface="Menlo Regular"/>
-                <a:cs typeface="Menlo Regular"/>
-                <a:sym typeface="Courier New"/>
-              </a:rPr>
-              <a:t>Walsh</a:t>
-            </a:r>
-            <a:r>
-              <a:rPr lang="en" sz="2200" dirty="0" smtClean="0">
-                <a:solidFill>
-                  <a:srgbClr val="FF0000"/>
-                </a:solidFill>
-                <a:latin typeface="Menlo Regular"/>
-                <a:ea typeface="Menlo Regular"/>
-                <a:cs typeface="Menlo Regular"/>
-                <a:sym typeface="Courier New"/>
-              </a:rPr>
-              <a:t>‘</a:t>
+              <a:t>'</a:t>
             </a:r>
             <a:r>
               <a:rPr lang="en" sz="2200" dirty="0" smtClean="0">
@@ -26190,7 +27991,7 @@
   <p:clrMapOvr>
     <a:masterClrMapping/>
   </p:clrMapOvr>
-  <p:transition spd="slow">
+  <p:transition xmlns:p14="http://schemas.microsoft.com/office/powerpoint/2010/main" spd="slow">
     <p:cut/>
   </p:transition>
 </p:sld>
@@ -26239,47 +28040,17 @@
           <a:lstStyle/>
           <a:p>
             <a:r>
-              <a:rPr lang="en-US" sz="9600" dirty="0" smtClean="0">
+              <a:rPr lang="en-US" sz="5000" dirty="0" smtClean="0">
                 <a:solidFill>
                   <a:srgbClr val="FF0000"/>
                 </a:solidFill>
                 <a:latin typeface="Yanone Kaffeesatz Bold"/>
                 <a:cs typeface="Yanone Kaffeesatz Bold"/>
               </a:rPr>
-              <a:t>An</a:t>
-            </a:r>
-            <a:r>
-              <a:rPr lang="en-US" dirty="0" smtClean="0">
-                <a:solidFill>
-                  <a:srgbClr val="FF0000"/>
-                </a:solidFill>
-                <a:latin typeface="Yanone Kaffeesatz Bold"/>
-                <a:cs typeface="Yanone Kaffeesatz Bold"/>
-              </a:rPr>
-              <a:t> </a:t>
-            </a:r>
-            <a:r>
-              <a:rPr lang="en-US" sz="9600" dirty="0" smtClean="0">
-                <a:solidFill>
-                  <a:srgbClr val="FF0000"/>
-                </a:solidFill>
-                <a:latin typeface="Yanone Kaffeesatz Bold"/>
-                <a:cs typeface="Yanone Kaffeesatz Bold"/>
-              </a:rPr>
-              <a:t>Answer</a:t>
-            </a:r>
-            <a:r>
-              <a:rPr lang="en-US" dirty="0" smtClean="0">
-                <a:solidFill>
-                  <a:srgbClr val="FF0000"/>
-                </a:solidFill>
-                <a:latin typeface="Yanone Kaffeesatz Bold"/>
-                <a:cs typeface="Yanone Kaffeesatz Bold"/>
-              </a:rPr>
-              <a:t>: </a:t>
-            </a:r>
-            <a:r>
-              <a:rPr lang="en-US" dirty="0" smtClean="0">
+              <a:t>An Answer: </a:t>
+            </a:r>
+            <a:r>
+              <a:rPr lang="en-US" sz="5000" dirty="0" smtClean="0">
                 <a:solidFill>
                   <a:schemeClr val="bg2"/>
                 </a:solidFill>
@@ -26288,7 +28059,7 @@
               </a:rPr>
               <a:t>continued</a:t>
             </a:r>
-            <a:endParaRPr lang="en" dirty="0">
+            <a:endParaRPr lang="en" sz="5000" dirty="0">
               <a:solidFill>
                 <a:schemeClr val="bg2"/>
               </a:solidFill>
@@ -26471,7 +28242,31 @@
                 <a:cs typeface="Menlo Regular"/>
                 <a:sym typeface="Courier New"/>
               </a:rPr>
-              <a:t>.“)</a:t>
+              <a:t>.</a:t>
+            </a:r>
+            <a:r>
+              <a:rPr lang="en-US" sz="2400" dirty="0" smtClean="0">
+                <a:solidFill>
+                  <a:srgbClr val="FF0000"/>
+                </a:solidFill>
+                <a:latin typeface="Menlo Regular"/>
+                <a:ea typeface="Menlo Regular"/>
+                <a:cs typeface="Menlo Regular"/>
+                <a:sym typeface="Courier New"/>
+              </a:rPr>
+              <a:t>"</a:t>
+            </a:r>
+            <a:r>
+              <a:rPr lang="en" sz="2400" dirty="0" smtClean="0">
+                <a:solidFill>
+                  <a:srgbClr val="FF0000"/>
+                </a:solidFill>
+                <a:latin typeface="Menlo Regular"/>
+                <a:ea typeface="Menlo Regular"/>
+                <a:cs typeface="Menlo Regular"/>
+                <a:sym typeface="Courier New"/>
+              </a:rPr>
+              <a:t>)</a:t>
             </a:r>
             <a:endParaRPr lang="en" sz="2400" dirty="0">
               <a:solidFill>
@@ -26515,7 +28310,7 @@
   <p:clrMapOvr>
     <a:masterClrMapping/>
   </p:clrMapOvr>
-  <p:transition spd="slow">
+  <p:transition xmlns:p14="http://schemas.microsoft.com/office/powerpoint/2010/main" spd="slow">
     <p:cut/>
   </p:transition>
 </p:sld>
@@ -26587,7 +28382,7 @@
   <p:clrMapOvr>
     <a:masterClrMapping/>
   </p:clrMapOvr>
-  <p:transition spd="slow">
+  <p:transition xmlns:p14="http://schemas.microsoft.com/office/powerpoint/2010/main" spd="slow">
     <p:cut/>
   </p:transition>
 </p:sld>
@@ -26976,7 +28771,7 @@
   <p:clrMapOvr>
     <a:masterClrMapping/>
   </p:clrMapOvr>
-  <p:transition spd="slow">
+  <p:transition xmlns:p14="http://schemas.microsoft.com/office/powerpoint/2010/main" spd="slow">
     <p:cut/>
   </p:transition>
 </p:sld>
@@ -27405,7 +29200,7 @@
   <p:clrMapOvr>
     <a:masterClrMapping/>
   </p:clrMapOvr>
-  <p:transition spd="slow">
+  <p:transition xmlns:p14="http://schemas.microsoft.com/office/powerpoint/2010/main" spd="slow">
     <p:cut/>
   </p:transition>
 </p:sld>
@@ -27679,7 +29474,7 @@
   <p:clrMapOvr>
     <a:masterClrMapping/>
   </p:clrMapOvr>
-  <p:transition spd="slow">
+  <p:transition xmlns:p14="http://schemas.microsoft.com/office/powerpoint/2010/main" spd="slow">
     <p:cut/>
   </p:transition>
 </p:sld>
@@ -28018,7 +29813,7 @@
   <p:clrMapOvr>
     <a:masterClrMapping/>
   </p:clrMapOvr>
-  <p:transition spd="slow">
+  <p:transition xmlns:p14="http://schemas.microsoft.com/office/powerpoint/2010/main" spd="slow">
     <p:cut/>
   </p:transition>
 </p:sld>
@@ -28405,7 +30200,7 @@
   <p:clrMapOvr>
     <a:masterClrMapping/>
   </p:clrMapOvr>
-  <p:transition spd="slow">
+  <p:transition xmlns:p14="http://schemas.microsoft.com/office/powerpoint/2010/main" spd="slow">
     <p:cut/>
   </p:transition>
 </p:sld>

</xml_diff>